<commit_message>
hue fix and new examples
</commit_message>
<xml_diff>
--- a/Figs/KaveExamples.pptx
+++ b/Figs/KaveExamples.pptx
@@ -245,7 +245,7 @@
           <a:p>
             <a:fld id="{EB0E6EFB-24B0-4663-B9F1-49AC475DFDDC}" type="datetimeFigureOut">
               <a:rPr lang="en-US" smtClean="0"/>
-              <a:t>28/4/2016</a:t>
+              <a:t>15/6/2016</a:t>
             </a:fld>
             <a:endParaRPr lang="en-US"/>
           </a:p>
@@ -415,7 +415,7 @@
           <a:p>
             <a:fld id="{EB0E6EFB-24B0-4663-B9F1-49AC475DFDDC}" type="datetimeFigureOut">
               <a:rPr lang="en-US" smtClean="0"/>
-              <a:t>28/4/2016</a:t>
+              <a:t>15/6/2016</a:t>
             </a:fld>
             <a:endParaRPr lang="en-US"/>
           </a:p>
@@ -595,7 +595,7 @@
           <a:p>
             <a:fld id="{EB0E6EFB-24B0-4663-B9F1-49AC475DFDDC}" type="datetimeFigureOut">
               <a:rPr lang="en-US" smtClean="0"/>
-              <a:t>28/4/2016</a:t>
+              <a:t>15/6/2016</a:t>
             </a:fld>
             <a:endParaRPr lang="en-US"/>
           </a:p>
@@ -765,7 +765,7 @@
           <a:p>
             <a:fld id="{EB0E6EFB-24B0-4663-B9F1-49AC475DFDDC}" type="datetimeFigureOut">
               <a:rPr lang="en-US" smtClean="0"/>
-              <a:t>28/4/2016</a:t>
+              <a:t>15/6/2016</a:t>
             </a:fld>
             <a:endParaRPr lang="en-US"/>
           </a:p>
@@ -1009,7 +1009,7 @@
           <a:p>
             <a:fld id="{EB0E6EFB-24B0-4663-B9F1-49AC475DFDDC}" type="datetimeFigureOut">
               <a:rPr lang="en-US" smtClean="0"/>
-              <a:t>28/4/2016</a:t>
+              <a:t>15/6/2016</a:t>
             </a:fld>
             <a:endParaRPr lang="en-US"/>
           </a:p>
@@ -1241,7 +1241,7 @@
           <a:p>
             <a:fld id="{EB0E6EFB-24B0-4663-B9F1-49AC475DFDDC}" type="datetimeFigureOut">
               <a:rPr lang="en-US" smtClean="0"/>
-              <a:t>28/4/2016</a:t>
+              <a:t>15/6/2016</a:t>
             </a:fld>
             <a:endParaRPr lang="en-US"/>
           </a:p>
@@ -1608,7 +1608,7 @@
           <a:p>
             <a:fld id="{EB0E6EFB-24B0-4663-B9F1-49AC475DFDDC}" type="datetimeFigureOut">
               <a:rPr lang="en-US" smtClean="0"/>
-              <a:t>28/4/2016</a:t>
+              <a:t>15/6/2016</a:t>
             </a:fld>
             <a:endParaRPr lang="en-US"/>
           </a:p>
@@ -1726,7 +1726,7 @@
           <a:p>
             <a:fld id="{EB0E6EFB-24B0-4663-B9F1-49AC475DFDDC}" type="datetimeFigureOut">
               <a:rPr lang="en-US" smtClean="0"/>
-              <a:t>28/4/2016</a:t>
+              <a:t>15/6/2016</a:t>
             </a:fld>
             <a:endParaRPr lang="en-US"/>
           </a:p>
@@ -1821,7 +1821,7 @@
           <a:p>
             <a:fld id="{EB0E6EFB-24B0-4663-B9F1-49AC475DFDDC}" type="datetimeFigureOut">
               <a:rPr lang="en-US" smtClean="0"/>
-              <a:t>28/4/2016</a:t>
+              <a:t>15/6/2016</a:t>
             </a:fld>
             <a:endParaRPr lang="en-US"/>
           </a:p>
@@ -2098,7 +2098,7 @@
           <a:p>
             <a:fld id="{EB0E6EFB-24B0-4663-B9F1-49AC475DFDDC}" type="datetimeFigureOut">
               <a:rPr lang="en-US" smtClean="0"/>
-              <a:t>28/4/2016</a:t>
+              <a:t>15/6/2016</a:t>
             </a:fld>
             <a:endParaRPr lang="en-US"/>
           </a:p>
@@ -2355,7 +2355,7 @@
           <a:p>
             <a:fld id="{EB0E6EFB-24B0-4663-B9F1-49AC475DFDDC}" type="datetimeFigureOut">
               <a:rPr lang="en-US" smtClean="0"/>
-              <a:t>28/4/2016</a:t>
+              <a:t>15/6/2016</a:t>
             </a:fld>
             <a:endParaRPr lang="en-US"/>
           </a:p>
@@ -2568,7 +2568,7 @@
           <a:p>
             <a:fld id="{EB0E6EFB-24B0-4663-B9F1-49AC475DFDDC}" type="datetimeFigureOut">
               <a:rPr lang="en-US" smtClean="0"/>
-              <a:t>28/4/2016</a:t>
+              <a:t>15/6/2016</a:t>
             </a:fld>
             <a:endParaRPr lang="en-US"/>
           </a:p>
@@ -3107,8 +3107,8 @@
         </p:nvSpPr>
         <p:spPr>
           <a:xfrm>
-            <a:off x="5504553" y="1794509"/>
-            <a:ext cx="1335203" cy="1257868"/>
+            <a:off x="5504553" y="1794508"/>
+            <a:ext cx="1335203" cy="1340087"/>
           </a:xfrm>
           <a:prstGeom prst="flowChartProcess">
             <a:avLst/>
@@ -3156,9 +3156,16 @@
           </a:p>
           <a:p>
             <a:r>
+              <a:rPr lang="en-US" sz="800" b="1" dirty="0"/>
+              <a:t>METRICS_COLLECTOR</a:t>
+            </a:r>
+          </a:p>
+          <a:p>
+            <a:r>
               <a:rPr lang="en-US" sz="800" b="1" dirty="0" smtClean="0"/>
-              <a:t>METRICS_COLLECTOR</a:t>
-            </a:r>
+              <a:t>METRICS_GRAFANA</a:t>
+            </a:r>
+            <a:endParaRPr lang="en-US" sz="800" b="1" dirty="0" smtClean="0"/>
           </a:p>
           <a:p>
             <a:r>
@@ -4826,8 +4833,14 @@
           </a:p>
           <a:p>
             <a:r>
+              <a:rPr lang="en-US" sz="800" b="1" dirty="0"/>
+              <a:t>METRICS_COLLECTOR</a:t>
+            </a:r>
+          </a:p>
+          <a:p>
+            <a:r>
               <a:rPr lang="en-US" sz="800" b="1" dirty="0" smtClean="0"/>
-              <a:t>METRICS_COLLECTOR</a:t>
+              <a:t>METRICS_GRAFANA</a:t>
             </a:r>
             <a:endParaRPr lang="en-US" sz="800" b="1" dirty="0"/>
           </a:p>
@@ -6101,7 +6114,6 @@
               <a:rPr lang="en-US" dirty="0"/>
               <a:t>example.kave.io</a:t>
             </a:r>
-            <a:endParaRPr lang="en-US" dirty="0"/>
           </a:p>
         </p:txBody>
       </p:sp>
@@ -6652,7 +6664,6 @@
               <a:rPr lang="en-US" sz="800" b="1" dirty="0" smtClean="0"/>
               <a:t>STORMSD_LOG_VIEWER</a:t>
             </a:r>
-            <a:endParaRPr lang="en-US" sz="800" b="1" dirty="0" smtClean="0"/>
           </a:p>
           <a:p>
             <a:r>
@@ -8567,6 +8578,13 @@
               <a:rPr lang="en-US" sz="800" b="1" dirty="0"/>
               <a:t>METRICS_COLLECTOR</a:t>
             </a:r>
+          </a:p>
+          <a:p>
+            <a:r>
+              <a:rPr lang="en-US" sz="800" b="1" smtClean="0"/>
+              <a:t>METRICS_GRAFANA</a:t>
+            </a:r>
+            <a:endParaRPr lang="en-US" sz="800" b="1" dirty="0"/>
           </a:p>
           <a:p>
             <a:r>

</xml_diff>

<commit_message>
update diagrams and version schema
</commit_message>
<xml_diff>
--- a/Figs/KaveExamples.pptx
+++ b/Figs/KaveExamples.pptx
@@ -245,7 +245,7 @@
           <a:p>
             <a:fld id="{EB0E6EFB-24B0-4663-B9F1-49AC475DFDDC}" type="datetimeFigureOut">
               <a:rPr lang="en-US" smtClean="0"/>
-              <a:t>15/6/2016</a:t>
+              <a:t>1/9/2016</a:t>
             </a:fld>
             <a:endParaRPr lang="en-US"/>
           </a:p>
@@ -415,7 +415,7 @@
           <a:p>
             <a:fld id="{EB0E6EFB-24B0-4663-B9F1-49AC475DFDDC}" type="datetimeFigureOut">
               <a:rPr lang="en-US" smtClean="0"/>
-              <a:t>15/6/2016</a:t>
+              <a:t>1/9/2016</a:t>
             </a:fld>
             <a:endParaRPr lang="en-US"/>
           </a:p>
@@ -595,7 +595,7 @@
           <a:p>
             <a:fld id="{EB0E6EFB-24B0-4663-B9F1-49AC475DFDDC}" type="datetimeFigureOut">
               <a:rPr lang="en-US" smtClean="0"/>
-              <a:t>15/6/2016</a:t>
+              <a:t>1/9/2016</a:t>
             </a:fld>
             <a:endParaRPr lang="en-US"/>
           </a:p>
@@ -765,7 +765,7 @@
           <a:p>
             <a:fld id="{EB0E6EFB-24B0-4663-B9F1-49AC475DFDDC}" type="datetimeFigureOut">
               <a:rPr lang="en-US" smtClean="0"/>
-              <a:t>15/6/2016</a:t>
+              <a:t>1/9/2016</a:t>
             </a:fld>
             <a:endParaRPr lang="en-US"/>
           </a:p>
@@ -1009,7 +1009,7 @@
           <a:p>
             <a:fld id="{EB0E6EFB-24B0-4663-B9F1-49AC475DFDDC}" type="datetimeFigureOut">
               <a:rPr lang="en-US" smtClean="0"/>
-              <a:t>15/6/2016</a:t>
+              <a:t>1/9/2016</a:t>
             </a:fld>
             <a:endParaRPr lang="en-US"/>
           </a:p>
@@ -1241,7 +1241,7 @@
           <a:p>
             <a:fld id="{EB0E6EFB-24B0-4663-B9F1-49AC475DFDDC}" type="datetimeFigureOut">
               <a:rPr lang="en-US" smtClean="0"/>
-              <a:t>15/6/2016</a:t>
+              <a:t>1/9/2016</a:t>
             </a:fld>
             <a:endParaRPr lang="en-US"/>
           </a:p>
@@ -1608,7 +1608,7 @@
           <a:p>
             <a:fld id="{EB0E6EFB-24B0-4663-B9F1-49AC475DFDDC}" type="datetimeFigureOut">
               <a:rPr lang="en-US" smtClean="0"/>
-              <a:t>15/6/2016</a:t>
+              <a:t>1/9/2016</a:t>
             </a:fld>
             <a:endParaRPr lang="en-US"/>
           </a:p>
@@ -1726,7 +1726,7 @@
           <a:p>
             <a:fld id="{EB0E6EFB-24B0-4663-B9F1-49AC475DFDDC}" type="datetimeFigureOut">
               <a:rPr lang="en-US" smtClean="0"/>
-              <a:t>15/6/2016</a:t>
+              <a:t>1/9/2016</a:t>
             </a:fld>
             <a:endParaRPr lang="en-US"/>
           </a:p>
@@ -1821,7 +1821,7 @@
           <a:p>
             <a:fld id="{EB0E6EFB-24B0-4663-B9F1-49AC475DFDDC}" type="datetimeFigureOut">
               <a:rPr lang="en-US" smtClean="0"/>
-              <a:t>15/6/2016</a:t>
+              <a:t>1/9/2016</a:t>
             </a:fld>
             <a:endParaRPr lang="en-US"/>
           </a:p>
@@ -2098,7 +2098,7 @@
           <a:p>
             <a:fld id="{EB0E6EFB-24B0-4663-B9F1-49AC475DFDDC}" type="datetimeFigureOut">
               <a:rPr lang="en-US" smtClean="0"/>
-              <a:t>15/6/2016</a:t>
+              <a:t>1/9/2016</a:t>
             </a:fld>
             <a:endParaRPr lang="en-US"/>
           </a:p>
@@ -2355,7 +2355,7 @@
           <a:p>
             <a:fld id="{EB0E6EFB-24B0-4663-B9F1-49AC475DFDDC}" type="datetimeFigureOut">
               <a:rPr lang="en-US" smtClean="0"/>
-              <a:t>15/6/2016</a:t>
+              <a:t>1/9/2016</a:t>
             </a:fld>
             <a:endParaRPr lang="en-US"/>
           </a:p>
@@ -2568,7 +2568,7 @@
           <a:p>
             <a:fld id="{EB0E6EFB-24B0-4663-B9F1-49AC475DFDDC}" type="datetimeFigureOut">
               <a:rPr lang="en-US" smtClean="0"/>
-              <a:t>15/6/2016</a:t>
+              <a:t>1/9/2016</a:t>
             </a:fld>
             <a:endParaRPr lang="en-US"/>
           </a:p>
@@ -2981,8 +2981,8 @@
         </p:nvSpPr>
         <p:spPr>
           <a:xfrm>
-            <a:off x="3689838" y="1460788"/>
-            <a:ext cx="3370245" cy="3428712"/>
+            <a:off x="3689838" y="1460787"/>
+            <a:ext cx="3370245" cy="3688981"/>
           </a:xfrm>
           <a:prstGeom prst="flowChartProcess">
             <a:avLst/>
@@ -3023,8 +3023,8 @@
         </p:nvSpPr>
         <p:spPr>
           <a:xfrm>
-            <a:off x="3949024" y="1794509"/>
-            <a:ext cx="1335203" cy="1171074"/>
+            <a:off x="3949024" y="1794508"/>
+            <a:ext cx="1335203" cy="1257867"/>
           </a:xfrm>
           <a:prstGeom prst="flowChartProcess">
             <a:avLst/>
@@ -3092,8 +3092,14 @@
           </a:p>
           <a:p>
             <a:r>
-              <a:rPr lang="en-US" sz="800" i="1" dirty="0" smtClean="0"/>
+              <a:rPr lang="en-US" sz="800" i="1" dirty="0"/>
               <a:t>ZOOKEEPER_CLIENT</a:t>
+            </a:r>
+          </a:p>
+          <a:p>
+            <a:r>
+              <a:rPr lang="nl-NL" sz="800" i="1" dirty="0" smtClean="0"/>
+              <a:t>KAVEGANGLIA_MONITOR</a:t>
             </a:r>
             <a:endParaRPr lang="en-US" sz="800" i="1" dirty="0"/>
           </a:p>
@@ -3107,8 +3113,8 @@
         </p:nvSpPr>
         <p:spPr>
           <a:xfrm>
-            <a:off x="5504553" y="1794508"/>
-            <a:ext cx="1335203" cy="1340087"/>
+            <a:off x="5504553" y="1794509"/>
+            <a:ext cx="1335203" cy="1523656"/>
           </a:xfrm>
           <a:prstGeom prst="flowChartProcess">
             <a:avLst/>
@@ -3165,12 +3171,11 @@
               <a:rPr lang="en-US" sz="800" b="1" dirty="0" smtClean="0"/>
               <a:t>METRICS_GRAFANA</a:t>
             </a:r>
-            <a:endParaRPr lang="en-US" sz="800" b="1" dirty="0" smtClean="0"/>
           </a:p>
           <a:p>
             <a:r>
               <a:rPr lang="en-US" sz="800" b="1" dirty="0" smtClean="0"/>
-              <a:t>FREEIPA_SERVER</a:t>
+              <a:t>KAVEGANGLIA_SERVER</a:t>
             </a:r>
             <a:endParaRPr lang="en-US" sz="800" b="1" i="1" dirty="0" smtClean="0"/>
           </a:p>
@@ -3182,8 +3187,15 @@
           </a:p>
           <a:p>
             <a:r>
-              <a:rPr lang="nl-NL" sz="800" i="1" dirty="0"/>
+              <a:rPr lang="nl-NL" sz="800" i="1" dirty="0" smtClean="0"/>
               <a:t>METRICS_MONITOR</a:t>
+            </a:r>
+            <a:endParaRPr lang="en-US" sz="800" i="1" dirty="0"/>
+          </a:p>
+          <a:p>
+            <a:r>
+              <a:rPr lang="nl-NL" sz="800" i="1" dirty="0" smtClean="0"/>
+              <a:t>KAVEGANGLIA_MONITOR</a:t>
             </a:r>
             <a:endParaRPr lang="en-US" sz="800" i="1" dirty="0"/>
           </a:p>
@@ -3203,8 +3215,8 @@
         </p:nvSpPr>
         <p:spPr>
           <a:xfrm>
-            <a:off x="3949023" y="3052376"/>
-            <a:ext cx="1335203" cy="1760923"/>
+            <a:off x="3956879" y="3177962"/>
+            <a:ext cx="1335203" cy="1837124"/>
           </a:xfrm>
           <a:prstGeom prst="flowChartProcess">
             <a:avLst/>
@@ -3298,8 +3310,15 @@
           </a:p>
           <a:p>
             <a:r>
-              <a:rPr lang="nl-NL" sz="800" i="1" dirty="0"/>
+              <a:rPr lang="nl-NL" sz="800" i="1" dirty="0" smtClean="0"/>
               <a:t>METRICS_MONITOR</a:t>
+            </a:r>
+            <a:endParaRPr lang="en-US" sz="800" i="1" dirty="0"/>
+          </a:p>
+          <a:p>
+            <a:r>
+              <a:rPr lang="nl-NL" sz="800" i="1" dirty="0" smtClean="0"/>
+              <a:t>KAVEGANGLIA_MONITOR</a:t>
             </a:r>
             <a:endParaRPr lang="en-US" sz="800" i="1" dirty="0"/>
           </a:p>
@@ -3322,8 +3341,8 @@
         </p:nvCxnSpPr>
         <p:spPr>
           <a:xfrm>
-            <a:off x="3508648" y="2380046"/>
-            <a:ext cx="440376" cy="0"/>
+            <a:off x="3508648" y="2421170"/>
+            <a:ext cx="440376" cy="2272"/>
           </a:xfrm>
           <a:prstGeom prst="line">
             <a:avLst/>
@@ -3647,8 +3666,8 @@
         </p:nvCxnSpPr>
         <p:spPr>
           <a:xfrm flipV="1">
-            <a:off x="2079308" y="2380046"/>
-            <a:ext cx="639978" cy="93400"/>
+            <a:off x="2079308" y="2421170"/>
+            <a:ext cx="639978" cy="52276"/>
           </a:xfrm>
           <a:prstGeom prst="line">
             <a:avLst/>
@@ -3712,8 +3731,8 @@
         </p:nvCxnSpPr>
         <p:spPr>
           <a:xfrm flipV="1">
-            <a:off x="3005162" y="2687999"/>
-            <a:ext cx="107906" cy="446597"/>
+            <a:off x="3005162" y="2729123"/>
+            <a:ext cx="107906" cy="405473"/>
           </a:xfrm>
           <a:prstGeom prst="line">
             <a:avLst/>
@@ -3744,8 +3763,8 @@
         </p:nvCxnSpPr>
         <p:spPr>
           <a:xfrm flipH="1">
-            <a:off x="4616451" y="4813299"/>
-            <a:ext cx="174" cy="391511"/>
+            <a:off x="4620491" y="5015086"/>
+            <a:ext cx="3990" cy="468403"/>
           </a:xfrm>
           <a:prstGeom prst="straightConnector1">
             <a:avLst/>
@@ -3780,7 +3799,7 @@
         </p:nvSpPr>
         <p:spPr>
           <a:xfrm>
-            <a:off x="4797155" y="4889500"/>
+            <a:off x="4686719" y="5150766"/>
             <a:ext cx="1075679" cy="461665"/>
           </a:xfrm>
           <a:prstGeom prst="rect">
@@ -4411,7 +4430,7 @@
         </p:nvSpPr>
         <p:spPr>
           <a:xfrm>
-            <a:off x="2716828" y="2071436"/>
+            <a:off x="2716828" y="2112560"/>
             <a:ext cx="792480" cy="617220"/>
           </a:xfrm>
           <a:prstGeom prst="cloud">
@@ -4457,30 +4476,6 @@
       </p:sp>
       <p:pic>
         <p:nvPicPr>
-          <p:cNvPr id="1038" name="Picture 1037"/>
-          <p:cNvPicPr>
-            <a:picLocks noChangeAspect="1"/>
-          </p:cNvPicPr>
-          <p:nvPr/>
-        </p:nvPicPr>
-        <p:blipFill>
-          <a:blip r:embed="rId3"/>
-          <a:stretch>
-            <a:fillRect/>
-          </a:stretch>
-        </p:blipFill>
-        <p:spPr>
-          <a:xfrm>
-            <a:off x="5872834" y="3230266"/>
-            <a:ext cx="628738" cy="1481344"/>
-          </a:xfrm>
-          <a:prstGeom prst="rect">
-            <a:avLst/>
-          </a:prstGeom>
-        </p:spPr>
-      </p:pic>
-      <p:pic>
-        <p:nvPicPr>
           <p:cNvPr id="58" name="Picture 57"/>
           <p:cNvPicPr>
             <a:picLocks noChangeAspect="1"/>
@@ -4540,6 +4535,134 @@
           </a:p>
         </p:txBody>
       </p:sp>
+      <p:sp>
+        <p:nvSpPr>
+          <p:cNvPr id="42" name="Flowchart: Process 41"/>
+          <p:cNvSpPr/>
+          <p:nvPr/>
+        </p:nvSpPr>
+        <p:spPr>
+          <a:xfrm>
+            <a:off x="5505482" y="3373585"/>
+            <a:ext cx="1335203" cy="1011379"/>
+          </a:xfrm>
+          <a:prstGeom prst="flowChartProcess">
+            <a:avLst/>
+          </a:prstGeom>
+          <a:ln w="28575"/>
+        </p:spPr>
+        <p:style>
+          <a:lnRef idx="2">
+            <a:schemeClr val="accent6"/>
+          </a:lnRef>
+          <a:fillRef idx="1">
+            <a:schemeClr val="lt1"/>
+          </a:fillRef>
+          <a:effectRef idx="0">
+            <a:schemeClr val="accent6"/>
+          </a:effectRef>
+          <a:fontRef idx="minor">
+            <a:schemeClr val="dk1"/>
+          </a:fontRef>
+        </p:style>
+        <p:txBody>
+          <a:bodyPr rtlCol="0" anchor="t"/>
+          <a:lstStyle/>
+          <a:p>
+            <a:pPr algn="ctr"/>
+            <a:r>
+              <a:rPr lang="en-US" sz="1050" b="1" dirty="0" smtClean="0"/>
+              <a:t>ipa.kave.org</a:t>
+            </a:r>
+            <a:endParaRPr lang="en-US" sz="1050" b="1" dirty="0" smtClean="0"/>
+          </a:p>
+          <a:p>
+            <a:endParaRPr lang="en-US" sz="1050" dirty="0" smtClean="0"/>
+          </a:p>
+          <a:p>
+            <a:r>
+              <a:rPr lang="en-US" sz="800" b="1" dirty="0" smtClean="0"/>
+              <a:t>FREEIPA_SERVER</a:t>
+            </a:r>
+            <a:endParaRPr lang="en-US" sz="800" b="1" i="1" dirty="0" smtClean="0"/>
+          </a:p>
+          <a:p>
+            <a:r>
+              <a:rPr lang="en-US" sz="800" i="1" dirty="0"/>
+              <a:t>FREEIPA_CLIENT</a:t>
+            </a:r>
+          </a:p>
+          <a:p>
+            <a:r>
+              <a:rPr lang="nl-NL" sz="800" i="1" dirty="0"/>
+              <a:t>METRICS_MONITOR</a:t>
+            </a:r>
+            <a:endParaRPr lang="en-US" sz="800" i="1" dirty="0"/>
+          </a:p>
+          <a:p>
+            <a:r>
+              <a:rPr lang="en-US" sz="800" i="1" dirty="0"/>
+              <a:t>ZOOKEEPER_CLIENT</a:t>
+            </a:r>
+          </a:p>
+          <a:p>
+            <a:r>
+              <a:rPr lang="nl-NL" sz="800" i="1" dirty="0"/>
+              <a:t>KAVEGANGLIA_MONITOR</a:t>
+            </a:r>
+            <a:endParaRPr lang="en-US" sz="800" i="1" dirty="0"/>
+          </a:p>
+          <a:p>
+            <a:endParaRPr lang="en-US" sz="800" i="1" dirty="0"/>
+          </a:p>
+        </p:txBody>
+      </p:sp>
+      <p:pic>
+        <p:nvPicPr>
+          <p:cNvPr id="45" name="Picture 44"/>
+          <p:cNvPicPr>
+            <a:picLocks noChangeAspect="1"/>
+          </p:cNvPicPr>
+          <p:nvPr/>
+        </p:nvPicPr>
+        <p:blipFill rotWithShape="1">
+          <a:blip r:embed="rId3"/>
+          <a:srcRect b="48239"/>
+          <a:stretch/>
+        </p:blipFill>
+        <p:spPr>
+          <a:xfrm>
+            <a:off x="5527898" y="4373916"/>
+            <a:ext cx="628738" cy="766761"/>
+          </a:xfrm>
+          <a:prstGeom prst="rect">
+            <a:avLst/>
+          </a:prstGeom>
+        </p:spPr>
+      </p:pic>
+      <p:pic>
+        <p:nvPicPr>
+          <p:cNvPr id="50" name="Picture 49"/>
+          <p:cNvPicPr>
+            <a:picLocks noChangeAspect="1"/>
+          </p:cNvPicPr>
+          <p:nvPr/>
+        </p:nvPicPr>
+        <p:blipFill rotWithShape="1">
+          <a:blip r:embed="rId3"/>
+          <a:srcRect t="50930" b="202"/>
+          <a:stretch/>
+        </p:blipFill>
+        <p:spPr>
+          <a:xfrm>
+            <a:off x="6218874" y="4425869"/>
+            <a:ext cx="628738" cy="723900"/>
+          </a:xfrm>
+          <a:prstGeom prst="rect">
+            <a:avLst/>
+          </a:prstGeom>
+        </p:spPr>
+      </p:pic>
     </p:spTree>
     <p:extLst>
       <p:ext uri="{BB962C8B-B14F-4D97-AF65-F5344CB8AC3E}">
@@ -4579,7 +4702,7 @@
         <p:spPr>
           <a:xfrm>
             <a:off x="3333871" y="1282912"/>
-            <a:ext cx="4912205" cy="5010795"/>
+            <a:ext cx="4912205" cy="5131743"/>
           </a:xfrm>
           <a:prstGeom prst="flowChartProcess">
             <a:avLst/>
@@ -4660,8 +4783,8 @@
         </p:nvSpPr>
         <p:spPr>
           <a:xfrm>
-            <a:off x="3572216" y="1482673"/>
-            <a:ext cx="1335203" cy="2034884"/>
+            <a:off x="3566656" y="1339004"/>
+            <a:ext cx="1335203" cy="2202636"/>
           </a:xfrm>
           <a:prstGeom prst="flowChartProcess">
             <a:avLst/>
@@ -4773,8 +4896,22 @@
           <a:p>
             <a:r>
               <a:rPr lang="en-US" sz="800" i="1" dirty="0" smtClean="0"/>
-              <a:t>ZOOKEEPER_CLIENT METRICS_MONITOR</a:t>
-            </a:r>
+              <a:t>ZOOKEEPER_CLIENT </a:t>
+            </a:r>
+            <a:endParaRPr lang="en-US" sz="800" i="1" dirty="0"/>
+          </a:p>
+          <a:p>
+            <a:r>
+              <a:rPr lang="nl-NL" sz="800" i="1" dirty="0" smtClean="0"/>
+              <a:t>KAVEGANGLIA_MONITOR</a:t>
+            </a:r>
+          </a:p>
+          <a:p>
+            <a:r>
+              <a:rPr lang="en-US" sz="800" i="1" dirty="0" smtClean="0"/>
+              <a:t>METRICS_MONITOR</a:t>
+            </a:r>
+            <a:endParaRPr lang="en-US" sz="800" i="1" dirty="0" smtClean="0"/>
           </a:p>
           <a:p>
             <a:pPr algn="ctr"/>
@@ -4790,8 +4927,8 @@
         </p:nvSpPr>
         <p:spPr>
           <a:xfrm>
-            <a:off x="6707822" y="5051522"/>
-            <a:ext cx="1335203" cy="1171074"/>
+            <a:off x="6707822" y="5051521"/>
+            <a:ext cx="1335203" cy="1298277"/>
           </a:xfrm>
           <a:prstGeom prst="flowChartProcess">
             <a:avLst/>
@@ -4846,8 +4983,8 @@
           </a:p>
           <a:p>
             <a:r>
-              <a:rPr lang="en-US" sz="800" b="1" dirty="0"/>
-              <a:t>FREEIPA_SERVER</a:t>
+              <a:rPr lang="en-US" sz="800" b="1" dirty="0" smtClean="0"/>
+              <a:t>KAVEGANGLIA_SERVER</a:t>
             </a:r>
             <a:endParaRPr lang="en-US" sz="800" b="1" i="1" dirty="0"/>
           </a:p>
@@ -4869,6 +5006,13 @@
               <a:rPr lang="en-US" sz="800" i="1" dirty="0"/>
               <a:t>ZOOKEEPER_CLIENT</a:t>
             </a:r>
+          </a:p>
+          <a:p>
+            <a:r>
+              <a:rPr lang="nl-NL" sz="800" i="1" dirty="0"/>
+              <a:t>KAVEGANGLIA_MONITOR</a:t>
+            </a:r>
+            <a:endParaRPr lang="en-US" sz="800" i="1" dirty="0"/>
           </a:p>
         </p:txBody>
       </p:sp>
@@ -4884,7 +5028,7 @@
         <p:spPr>
           <a:xfrm>
             <a:off x="3174104" y="2403463"/>
-            <a:ext cx="398112" cy="96652"/>
+            <a:ext cx="392552" cy="36859"/>
           </a:xfrm>
           <a:prstGeom prst="line">
             <a:avLst/>
@@ -4921,7 +5065,7 @@
         <p:spPr>
           <a:xfrm>
             <a:off x="5123440" y="1646596"/>
-            <a:ext cx="1335203" cy="3213726"/>
+            <a:ext cx="1335203" cy="3250986"/>
           </a:xfrm>
           <a:prstGeom prst="flowChartProcess">
             <a:avLst/>
@@ -4985,19 +5129,13 @@
               <a:rPr lang="en-US" sz="800" b="1" dirty="0" smtClean="0"/>
               <a:t>HISTORYSERVER</a:t>
             </a:r>
-            <a:endParaRPr lang="en-US" sz="800" b="1" dirty="0"/>
-          </a:p>
-          <a:p>
-            <a:r>
-              <a:rPr lang="en-US" sz="800" b="1" dirty="0"/>
-              <a:t>HUE_SERVER</a:t>
-            </a:r>
           </a:p>
           <a:p>
             <a:r>
               <a:rPr lang="en-US" sz="800" b="1" dirty="0" smtClean="0"/>
               <a:t>PIG</a:t>
             </a:r>
+            <a:endParaRPr lang="en-US" sz="800" b="1" dirty="0" smtClean="0"/>
           </a:p>
           <a:p>
             <a:r>
@@ -5093,7 +5231,17 @@
           <a:p>
             <a:r>
               <a:rPr lang="en-US" sz="800" i="1" dirty="0" smtClean="0"/>
-              <a:t>ZOOKEEPER_CLIENT METRICS_MONITOR</a:t>
+              <a:t>ZOOKEEPER_CLIENT </a:t>
+            </a:r>
+            <a:r>
+              <a:rPr lang="en-US" sz="800" i="1" dirty="0"/>
+              <a:t>METRICS_MONITOR</a:t>
+            </a:r>
+          </a:p>
+          <a:p>
+            <a:r>
+              <a:rPr lang="nl-NL" sz="800" i="1" dirty="0"/>
+              <a:t>KAVEGANGLIA_MONITOR</a:t>
             </a:r>
             <a:endParaRPr lang="en-US" sz="800" i="1" dirty="0"/>
           </a:p>
@@ -5174,7 +5322,21 @@
           <a:p>
             <a:r>
               <a:rPr lang="en-US" sz="800" i="1" dirty="0" smtClean="0"/>
-              <a:t>ZOOKEEPER_CLIENT METRICS_MONITOR</a:t>
+              <a:t>ZOOKEEPER_CLIENT </a:t>
+            </a:r>
+            <a:endParaRPr lang="en-US" sz="800" i="1" dirty="0"/>
+          </a:p>
+          <a:p>
+            <a:r>
+              <a:rPr lang="nl-NL" sz="800" i="1" dirty="0" smtClean="0"/>
+              <a:t>KAVEGANGLIA_MONITOR</a:t>
+            </a:r>
+            <a:br>
+              <a:rPr lang="nl-NL" sz="800" i="1" dirty="0" smtClean="0"/>
+            </a:br>
+            <a:r>
+              <a:rPr lang="en-US" sz="800" i="1" dirty="0" smtClean="0"/>
+              <a:t>METRICS_MONITOR</a:t>
             </a:r>
             <a:endParaRPr lang="en-US" sz="800" i="1" dirty="0"/>
           </a:p>
@@ -5346,7 +5508,17 @@
           <a:p>
             <a:r>
               <a:rPr lang="en-US" sz="800" i="1" dirty="0" smtClean="0"/>
-              <a:t>ZOOKEEPER_CLIENT METRICS_MONITOR</a:t>
+              <a:t>ZOOKEEPER_CLIENT </a:t>
+            </a:r>
+            <a:r>
+              <a:rPr lang="en-US" sz="800" i="1" dirty="0"/>
+              <a:t>METRICS_MONITOR</a:t>
+            </a:r>
+          </a:p>
+          <a:p>
+            <a:r>
+              <a:rPr lang="nl-NL" sz="800" i="1" dirty="0"/>
+              <a:t>KAVEGANGLIA_MONITOR</a:t>
             </a:r>
             <a:endParaRPr lang="en-US" sz="800" i="1" dirty="0"/>
           </a:p>
@@ -5898,8 +6070,8 @@
         </p:nvSpPr>
         <p:spPr>
           <a:xfrm>
-            <a:off x="3572216" y="3597956"/>
-            <a:ext cx="1335203" cy="2624639"/>
+            <a:off x="3554112" y="3612647"/>
+            <a:ext cx="1335203" cy="2737152"/>
           </a:xfrm>
           <a:prstGeom prst="flowChartProcess">
             <a:avLst/>
@@ -6045,7 +6217,20 @@
           <a:p>
             <a:r>
               <a:rPr lang="en-US" sz="800" i="1" dirty="0" smtClean="0"/>
-              <a:t>FREEIPA_CLIENT METRICS_MONITOR</a:t>
+              <a:t>FREEIPA_CLIENT </a:t>
+            </a:r>
+            <a:endParaRPr lang="en-US" sz="800" i="1" dirty="0"/>
+          </a:p>
+          <a:p>
+            <a:r>
+              <a:rPr lang="nl-NL" sz="800" i="1" dirty="0" smtClean="0"/>
+              <a:t>KAVEGANGLIA_MONITOR</a:t>
+            </a:r>
+          </a:p>
+          <a:p>
+            <a:r>
+              <a:rPr lang="en-US" sz="800" i="1" dirty="0" smtClean="0"/>
+              <a:t>METRICS_MONITOR</a:t>
             </a:r>
             <a:endParaRPr lang="en-US" sz="800" i="1" dirty="0"/>
           </a:p>
@@ -6132,7 +6317,7 @@
         </p:blipFill>
         <p:spPr>
           <a:xfrm>
-            <a:off x="5215527" y="5248664"/>
+            <a:off x="5229639" y="5668179"/>
             <a:ext cx="628738" cy="766761"/>
           </a:xfrm>
           <a:prstGeom prst="rect">
@@ -6216,7 +6401,7 @@
         </p:blipFill>
         <p:spPr>
           <a:xfrm>
-            <a:off x="5906503" y="5300617"/>
+            <a:off x="5864248" y="5731325"/>
             <a:ext cx="628738" cy="723900"/>
           </a:xfrm>
           <a:prstGeom prst="rect">
@@ -6224,6 +6409,87 @@
           </a:prstGeom>
         </p:spPr>
       </p:pic>
+      <p:sp>
+        <p:nvSpPr>
+          <p:cNvPr id="39" name="Flowchart: Process 38"/>
+          <p:cNvSpPr/>
+          <p:nvPr/>
+        </p:nvSpPr>
+        <p:spPr>
+          <a:xfrm>
+            <a:off x="5218005" y="5068636"/>
+            <a:ext cx="1335203" cy="1011379"/>
+          </a:xfrm>
+          <a:prstGeom prst="flowChartProcess">
+            <a:avLst/>
+          </a:prstGeom>
+          <a:ln w="28575"/>
+        </p:spPr>
+        <p:style>
+          <a:lnRef idx="2">
+            <a:schemeClr val="accent6"/>
+          </a:lnRef>
+          <a:fillRef idx="1">
+            <a:schemeClr val="lt1"/>
+          </a:fillRef>
+          <a:effectRef idx="0">
+            <a:schemeClr val="accent6"/>
+          </a:effectRef>
+          <a:fontRef idx="minor">
+            <a:schemeClr val="dk1"/>
+          </a:fontRef>
+        </p:style>
+        <p:txBody>
+          <a:bodyPr rtlCol="0" anchor="t"/>
+          <a:lstStyle/>
+          <a:p>
+            <a:pPr algn="ctr"/>
+            <a:r>
+              <a:rPr lang="en-US" sz="800" b="1" dirty="0"/>
+              <a:t>ipa.kave.org</a:t>
+            </a:r>
+          </a:p>
+          <a:p>
+            <a:endParaRPr lang="en-US" sz="1050" dirty="0" smtClean="0"/>
+          </a:p>
+          <a:p>
+            <a:r>
+              <a:rPr lang="en-US" sz="800" b="1" dirty="0" smtClean="0"/>
+              <a:t>FREEIPA_SERVER</a:t>
+            </a:r>
+            <a:endParaRPr lang="en-US" sz="800" b="1" i="1" dirty="0" smtClean="0"/>
+          </a:p>
+          <a:p>
+            <a:r>
+              <a:rPr lang="en-US" sz="800" i="1" dirty="0"/>
+              <a:t>FREEIPA_CLIENT</a:t>
+            </a:r>
+          </a:p>
+          <a:p>
+            <a:r>
+              <a:rPr lang="nl-NL" sz="800" i="1" dirty="0"/>
+              <a:t>METRICS_MONITOR</a:t>
+            </a:r>
+            <a:endParaRPr lang="en-US" sz="800" i="1" dirty="0"/>
+          </a:p>
+          <a:p>
+            <a:r>
+              <a:rPr lang="en-US" sz="800" i="1" dirty="0"/>
+              <a:t>ZOOKEEPER_CLIENT</a:t>
+            </a:r>
+          </a:p>
+          <a:p>
+            <a:r>
+              <a:rPr lang="nl-NL" sz="800" i="1" dirty="0"/>
+              <a:t>KAVEGANGLIA_MONITOR</a:t>
+            </a:r>
+            <a:endParaRPr lang="en-US" sz="800" i="1" dirty="0"/>
+          </a:p>
+          <a:p>
+            <a:endParaRPr lang="en-US" sz="800" i="1" dirty="0"/>
+          </a:p>
+        </p:txBody>
+      </p:sp>
     </p:spTree>
     <p:extLst>
       <p:ext uri="{BB962C8B-B14F-4D97-AF65-F5344CB8AC3E}">
@@ -6263,7 +6529,7 @@
         <p:spPr>
           <a:xfrm>
             <a:off x="2713793" y="474832"/>
-            <a:ext cx="6672662" cy="5481339"/>
+            <a:ext cx="6672662" cy="6632550"/>
           </a:xfrm>
           <a:prstGeom prst="flowChartProcess">
             <a:avLst/>
@@ -6303,8 +6569,8 @@
         </p:nvSpPr>
         <p:spPr>
           <a:xfrm>
-            <a:off x="2823322" y="536583"/>
-            <a:ext cx="1335203" cy="2377768"/>
+            <a:off x="2823322" y="536582"/>
+            <a:ext cx="1335203" cy="2635209"/>
           </a:xfrm>
           <a:prstGeom prst="flowChartProcess">
             <a:avLst/>
@@ -6440,8 +6706,8 @@
         </p:nvSpPr>
         <p:spPr>
           <a:xfrm>
-            <a:off x="2886780" y="598123"/>
-            <a:ext cx="1335203" cy="2377768"/>
+            <a:off x="2886780" y="598122"/>
+            <a:ext cx="1335203" cy="2635209"/>
           </a:xfrm>
           <a:prstGeom prst="flowChartProcess">
             <a:avLst/>
@@ -6486,7 +6752,7 @@
         </p:nvSpPr>
         <p:spPr>
           <a:xfrm>
-            <a:off x="4476913" y="4489368"/>
+            <a:off x="4476913" y="5632365"/>
             <a:ext cx="1544781" cy="1465443"/>
           </a:xfrm>
           <a:prstGeom prst="rect">
@@ -6529,8 +6795,8 @@
         </p:nvSpPr>
         <p:spPr>
           <a:xfrm>
-            <a:off x="7617057" y="826182"/>
-            <a:ext cx="1672415" cy="3004372"/>
+            <a:off x="7617057" y="826181"/>
+            <a:ext cx="1672415" cy="3431687"/>
           </a:xfrm>
           <a:prstGeom prst="rect">
             <a:avLst/>
@@ -6606,8 +6872,8 @@
         </p:nvSpPr>
         <p:spPr>
           <a:xfrm>
-            <a:off x="7789068" y="979318"/>
-            <a:ext cx="1335203" cy="1421548"/>
+            <a:off x="7789068" y="979317"/>
+            <a:ext cx="1335203" cy="1664091"/>
           </a:xfrm>
           <a:prstGeom prst="flowChartProcess">
             <a:avLst/>
@@ -6687,7 +6953,28 @@
           <a:p>
             <a:r>
               <a:rPr lang="en-US" sz="800" i="1" dirty="0" smtClean="0"/>
-              <a:t>ZOOKEEPER_CLIENT METRICS_MONITOR</a:t>
+              <a:t>ZOOKEEPER_CLIENT </a:t>
+            </a:r>
+            <a:endParaRPr lang="en-US" sz="800" i="1" dirty="0"/>
+          </a:p>
+          <a:p>
+            <a:r>
+              <a:rPr lang="nl-NL" sz="800" i="1" dirty="0" smtClean="0"/>
+              <a:t>KAVEGANGLIA_MONITOR</a:t>
+            </a:r>
+            <a:endParaRPr lang="en-US" sz="800" i="1" dirty="0"/>
+          </a:p>
+          <a:p>
+            <a:r>
+              <a:rPr lang="nl-NL" sz="800" i="1" dirty="0"/>
+              <a:t>KAVENAGIOS_MONITOR</a:t>
+            </a:r>
+            <a:endParaRPr lang="en-US" sz="800" i="1" dirty="0"/>
+          </a:p>
+          <a:p>
+            <a:r>
+              <a:rPr lang="en-US" sz="800" i="1" dirty="0" smtClean="0"/>
+              <a:t>METRICS_MONITOR</a:t>
             </a:r>
             <a:endParaRPr lang="en-US" sz="800" i="1" dirty="0"/>
           </a:p>
@@ -6701,8 +6988,8 @@
         </p:nvGrpSpPr>
         <p:grpSpPr>
           <a:xfrm>
-            <a:off x="7765074" y="2469100"/>
-            <a:ext cx="1420928" cy="1266324"/>
+            <a:off x="7765074" y="2733810"/>
+            <a:ext cx="1420928" cy="1401053"/>
             <a:chOff x="5186863" y="3041531"/>
             <a:chExt cx="1420928" cy="1266324"/>
           </a:xfrm>
@@ -6883,9 +7170,23 @@
             </a:p>
             <a:p>
               <a:r>
-                <a:rPr lang="en-US" sz="800" i="1" dirty="0" smtClean="0"/>
+                <a:rPr lang="en-US" sz="800" i="1" dirty="0"/>
                 <a:t>FREEIPA_CLIENT</a:t>
               </a:r>
+            </a:p>
+            <a:p>
+              <a:r>
+                <a:rPr lang="nl-NL" sz="800" i="1" dirty="0" smtClean="0"/>
+                <a:t>KAVEGANGLIA_MONITOR</a:t>
+              </a:r>
+              <a:endParaRPr lang="en-US" sz="800" i="1" dirty="0"/>
+            </a:p>
+            <a:p>
+              <a:r>
+                <a:rPr lang="nl-NL" sz="800" i="1" dirty="0"/>
+                <a:t>KAVENAGIOS_MONITOR</a:t>
+              </a:r>
+              <a:endParaRPr lang="en-US" sz="800" i="1" dirty="0" smtClean="0"/>
             </a:p>
             <a:p>
               <a:r>
@@ -6907,7 +7208,7 @@
         </p:nvSpPr>
         <p:spPr>
           <a:xfrm>
-            <a:off x="4581701" y="4552239"/>
+            <a:off x="4581701" y="5695236"/>
             <a:ext cx="1335203" cy="1171074"/>
           </a:xfrm>
           <a:prstGeom prst="flowChartProcess">
@@ -6945,8 +7246,9 @@
           <a:p>
             <a:r>
               <a:rPr lang="en-US" sz="800" b="1" dirty="0" smtClean="0"/>
-              <a:t>JBOSS_APP_MASTER</a:t>
-            </a:r>
+              <a:t>WILDFLY_APP_MASTER</a:t>
+            </a:r>
+            <a:endParaRPr lang="en-US" sz="800" b="1" dirty="0" smtClean="0"/>
           </a:p>
           <a:p>
             <a:r>
@@ -6971,7 +7273,21 @@
           <a:p>
             <a:r>
               <a:rPr lang="en-US" sz="800" i="1" dirty="0" smtClean="0"/>
-              <a:t>ZOOKEEPER_CLIENT METRICS_MONITOR</a:t>
+              <a:t>ZOOKEEPER_CLIENT </a:t>
+            </a:r>
+            <a:endParaRPr lang="en-US" sz="800" i="1" dirty="0"/>
+          </a:p>
+          <a:p>
+            <a:r>
+              <a:rPr lang="nl-NL" sz="800" i="1" dirty="0"/>
+              <a:t>KAVEGANGLIA_MONITOR</a:t>
+            </a:r>
+            <a:endParaRPr lang="en-US" sz="800" i="1" dirty="0"/>
+          </a:p>
+          <a:p>
+            <a:r>
+              <a:rPr lang="en-US" sz="800" i="1" dirty="0" smtClean="0"/>
+              <a:t>METRICS_MONITOR</a:t>
             </a:r>
             <a:endParaRPr lang="en-US" sz="800" i="1" dirty="0"/>
           </a:p>
@@ -6987,8 +7303,8 @@
         </p:nvCxnSpPr>
         <p:spPr>
           <a:xfrm>
-            <a:off x="5249303" y="5723313"/>
-            <a:ext cx="12007" cy="699584"/>
+            <a:off x="5249303" y="6866310"/>
+            <a:ext cx="15424" cy="518163"/>
           </a:xfrm>
           <a:prstGeom prst="straightConnector1">
             <a:avLst/>
@@ -7023,7 +7339,7 @@
         </p:nvSpPr>
         <p:spPr>
           <a:xfrm>
-            <a:off x="5469863" y="5677812"/>
+            <a:off x="5469863" y="6820809"/>
             <a:ext cx="490840" cy="276999"/>
           </a:xfrm>
           <a:prstGeom prst="rect">
@@ -7587,9 +7903,9 @@
         <p:grpSpPr>
           <a:xfrm>
             <a:off x="4476913" y="746015"/>
-            <a:ext cx="3089563" cy="3511855"/>
+            <a:ext cx="3089563" cy="3712494"/>
             <a:chOff x="4724927" y="1437222"/>
-            <a:chExt cx="3089563" cy="3511855"/>
+            <a:chExt cx="3089563" cy="3712494"/>
           </a:xfrm>
         </p:grpSpPr>
         <p:sp>
@@ -7601,7 +7917,7 @@
           <p:spPr>
             <a:xfrm>
               <a:off x="4724927" y="1517390"/>
-              <a:ext cx="3089563" cy="3431687"/>
+              <a:ext cx="3089563" cy="3632326"/>
             </a:xfrm>
             <a:prstGeom prst="rect">
               <a:avLst/>
@@ -7640,8 +7956,8 @@
           </p:nvSpPr>
           <p:spPr>
             <a:xfrm>
-              <a:off x="4805312" y="1596120"/>
-              <a:ext cx="1335203" cy="3275790"/>
+              <a:off x="4805312" y="1596119"/>
+              <a:ext cx="1335203" cy="3480181"/>
             </a:xfrm>
             <a:prstGeom prst="flowChartProcess">
               <a:avLst/>
@@ -7810,8 +8126,30 @@
             <a:p>
               <a:r>
                 <a:rPr lang="en-US" sz="800" i="1" dirty="0"/>
-                <a:t>ZOOKEEPER_CLIENT METRICS_MONITOR</a:t>
-              </a:r>
+                <a:t>ZOOKEEPER_CLIENT </a:t>
+              </a:r>
+              <a:endParaRPr lang="en-US" sz="800" i="1" dirty="0"/>
+            </a:p>
+            <a:p>
+              <a:r>
+                <a:rPr lang="nl-NL" sz="800" i="1" dirty="0" smtClean="0"/>
+                <a:t>KAVEGANGLIA_MONITOR</a:t>
+              </a:r>
+              <a:endParaRPr lang="en-US" sz="800" i="1" dirty="0"/>
+            </a:p>
+            <a:p>
+              <a:r>
+                <a:rPr lang="nl-NL" sz="800" i="1" dirty="0"/>
+                <a:t>KAVENAGIOS_MONITOR</a:t>
+              </a:r>
+              <a:endParaRPr lang="en-US" sz="800" i="1" dirty="0"/>
+            </a:p>
+            <a:p>
+              <a:r>
+                <a:rPr lang="en-US" sz="800" i="1" dirty="0" smtClean="0"/>
+                <a:t>METRICS_MONITOR</a:t>
+              </a:r>
+              <a:endParaRPr lang="en-US" sz="800" i="1" dirty="0"/>
             </a:p>
             <a:p>
               <a:r>
@@ -7830,8 +8168,8 @@
           </p:nvSpPr>
           <p:spPr>
             <a:xfrm>
-              <a:off x="6303969" y="1822926"/>
-              <a:ext cx="1335203" cy="1171074"/>
+              <a:off x="6303969" y="1822925"/>
+              <a:ext cx="1335203" cy="1293109"/>
             </a:xfrm>
             <a:prstGeom prst="flowChartProcess">
               <a:avLst/>
@@ -7897,7 +8235,28 @@
             <a:p>
               <a:r>
                 <a:rPr lang="en-US" sz="800" i="1" dirty="0" smtClean="0"/>
-                <a:t>ZOOKEEPER_CLIENT METRICS_MONITOR</a:t>
+                <a:t>ZOOKEEPER_CLIENT </a:t>
+              </a:r>
+              <a:endParaRPr lang="en-US" sz="800" i="1" dirty="0"/>
+            </a:p>
+            <a:p>
+              <a:r>
+                <a:rPr lang="nl-NL" sz="800" i="1" dirty="0" smtClean="0"/>
+                <a:t>KAVEGANGLIA_MONITOR</a:t>
+              </a:r>
+              <a:endParaRPr lang="en-US" sz="800" i="1" dirty="0"/>
+            </a:p>
+            <a:p>
+              <a:r>
+                <a:rPr lang="nl-NL" sz="800" i="1" dirty="0"/>
+                <a:t>KAVENAGIOS_MONITOR</a:t>
+              </a:r>
+              <a:endParaRPr lang="en-US" sz="800" i="1" dirty="0"/>
+            </a:p>
+            <a:p>
+              <a:r>
+                <a:rPr lang="en-US" sz="800" i="1" dirty="0" smtClean="0"/>
+                <a:t>METRICS_MONITOR</a:t>
               </a:r>
               <a:endParaRPr lang="en-US" sz="800" i="1" dirty="0"/>
             </a:p>
@@ -7911,8 +8270,8 @@
           </p:nvSpPr>
           <p:spPr>
             <a:xfrm>
-              <a:off x="6288729" y="3261794"/>
-              <a:ext cx="1335203" cy="1171074"/>
+              <a:off x="6288729" y="3261793"/>
+              <a:ext cx="1335203" cy="1314665"/>
             </a:xfrm>
             <a:prstGeom prst="flowChartProcess">
               <a:avLst/>
@@ -7962,8 +8321,8 @@
           </p:nvSpPr>
           <p:spPr>
             <a:xfrm>
-              <a:off x="6339113" y="3307263"/>
-              <a:ext cx="1335203" cy="1171074"/>
+              <a:off x="6339113" y="3307262"/>
+              <a:ext cx="1335203" cy="1314665"/>
             </a:xfrm>
             <a:prstGeom prst="flowChartProcess">
               <a:avLst/>
@@ -8013,8 +8372,8 @@
           </p:nvSpPr>
           <p:spPr>
             <a:xfrm>
-              <a:off x="6389694" y="3357044"/>
-              <a:ext cx="1335203" cy="1171074"/>
+              <a:off x="6389694" y="3357043"/>
+              <a:ext cx="1335203" cy="1314665"/>
             </a:xfrm>
             <a:prstGeom prst="flowChartProcess">
               <a:avLst/>
@@ -8073,7 +8432,24 @@
             <a:p>
               <a:r>
                 <a:rPr lang="en-US" sz="800" i="1" dirty="0" smtClean="0"/>
-                <a:t>ZOOKEEPER_CLIENT METRICS_MONITOR</a:t>
+                <a:t>ZOOKEEPER_CLIENT </a:t>
+              </a:r>
+              <a:r>
+                <a:rPr lang="en-US" sz="800" i="1" dirty="0"/>
+                <a:t>METRICS_MONITOR</a:t>
+              </a:r>
+            </a:p>
+            <a:p>
+              <a:r>
+                <a:rPr lang="nl-NL" sz="800" i="1" dirty="0" smtClean="0"/>
+                <a:t>KAVEGANGLIA_MONITOR</a:t>
+              </a:r>
+              <a:endParaRPr lang="en-US" sz="800" i="1" dirty="0"/>
+            </a:p>
+            <a:p>
+              <a:r>
+                <a:rPr lang="nl-NL" sz="800" i="1" dirty="0"/>
+                <a:t>KAVENAGIOS_MONITOR</a:t>
               </a:r>
               <a:endParaRPr lang="en-US" sz="800" i="1" dirty="0"/>
             </a:p>
@@ -8174,7 +8550,7 @@
         <p:spPr>
           <a:xfrm>
             <a:off x="2957607" y="658980"/>
-            <a:ext cx="1335203" cy="2380009"/>
+            <a:ext cx="1335203" cy="2637692"/>
           </a:xfrm>
           <a:prstGeom prst="flowChartProcess">
             <a:avLst/>
@@ -8309,7 +8685,28 @@
           <a:p>
             <a:r>
               <a:rPr lang="en-US" sz="800" i="1" dirty="0" smtClean="0"/>
-              <a:t>ZOOKEEPER_CLIENT METRICS_MONITOR</a:t>
+              <a:t>ZOOKEEPER_CLIENT </a:t>
+            </a:r>
+            <a:endParaRPr lang="en-US" sz="800" i="1" dirty="0"/>
+          </a:p>
+          <a:p>
+            <a:r>
+              <a:rPr lang="nl-NL" sz="800" i="1" dirty="0" smtClean="0"/>
+              <a:t>KAVEGANGLIA_MONITOR</a:t>
+            </a:r>
+            <a:endParaRPr lang="en-US" sz="800" i="1" dirty="0"/>
+          </a:p>
+          <a:p>
+            <a:r>
+              <a:rPr lang="nl-NL" sz="800" i="1" dirty="0"/>
+              <a:t>KAVENAGIOS_MONITOR</a:t>
+            </a:r>
+            <a:endParaRPr lang="en-US" sz="800" i="1" dirty="0"/>
+          </a:p>
+          <a:p>
+            <a:r>
+              <a:rPr lang="en-US" sz="800" i="1" dirty="0" smtClean="0"/>
+              <a:t>METRICS_MONITOR</a:t>
             </a:r>
             <a:endParaRPr lang="en-US" sz="1050" dirty="0"/>
           </a:p>
@@ -8323,8 +8720,8 @@
         </p:nvSpPr>
         <p:spPr>
           <a:xfrm>
-            <a:off x="2954931" y="3130418"/>
-            <a:ext cx="1335203" cy="2761320"/>
+            <a:off x="2946264" y="3460195"/>
+            <a:ext cx="1335203" cy="3120714"/>
           </a:xfrm>
           <a:prstGeom prst="flowChartProcess">
             <a:avLst/>
@@ -8365,8 +8762,15 @@
           <a:p>
             <a:r>
               <a:rPr lang="en-US" sz="800" b="1" dirty="0"/>
+              <a:t>GITLAB_SERVER</a:t>
+            </a:r>
+          </a:p>
+          <a:p>
+            <a:r>
+              <a:rPr lang="en-US" sz="800" b="1" dirty="0" smtClean="0"/>
               <a:t>JENKINS_MASTER</a:t>
             </a:r>
+            <a:endParaRPr lang="en-US" sz="800" b="1" dirty="0"/>
           </a:p>
           <a:p>
             <a:r>
@@ -8475,9 +8879,23 @@
           </a:p>
           <a:p>
             <a:r>
-              <a:rPr lang="en-US" sz="800" i="1" dirty="0" smtClean="0"/>
+              <a:rPr lang="en-US" sz="800" i="1" dirty="0"/>
               <a:t>FREEIPA_CLIENT</a:t>
             </a:r>
+          </a:p>
+          <a:p>
+            <a:r>
+              <a:rPr lang="nl-NL" sz="800" i="1" dirty="0" smtClean="0"/>
+              <a:t>KAVEGANGLIA_MONITOR</a:t>
+            </a:r>
+            <a:endParaRPr lang="en-US" sz="800" i="1" dirty="0"/>
+          </a:p>
+          <a:p>
+            <a:r>
+              <a:rPr lang="nl-NL" sz="800" i="1" dirty="0"/>
+              <a:t>KAVENAGIOS_MONITOR</a:t>
+            </a:r>
+            <a:endParaRPr lang="en-US" sz="800" i="1" dirty="0" smtClean="0"/>
           </a:p>
           <a:p>
             <a:r>
@@ -8496,7 +8914,7 @@
         </p:nvSpPr>
         <p:spPr>
           <a:xfrm>
-            <a:off x="5421154" y="6065174"/>
+            <a:off x="5420554" y="7102432"/>
             <a:ext cx="1023550" cy="461665"/>
           </a:xfrm>
           <a:prstGeom prst="rect">
@@ -8525,13 +8943,13 @@
       </p:sp>
       <p:sp>
         <p:nvSpPr>
-          <p:cNvPr id="78" name="Flowchart: Process 77"/>
+          <p:cNvPr id="23" name="Flowchart: Process 22"/>
           <p:cNvSpPr/>
           <p:nvPr/>
         </p:nvSpPr>
         <p:spPr>
           <a:xfrm>
-            <a:off x="7964423" y="4700333"/>
+            <a:off x="6333057" y="4694631"/>
             <a:ext cx="1335203" cy="1171074"/>
           </a:xfrm>
           <a:prstGeom prst="flowChartProcess">
@@ -8560,7 +8978,7 @@
             <a:pPr algn="ctr"/>
             <a:r>
               <a:rPr lang="en-US" sz="800" b="1" dirty="0" smtClean="0"/>
-              <a:t>ambari.kave.org</a:t>
+              <a:t>mongo.kave.org</a:t>
             </a:r>
           </a:p>
           <a:p>
@@ -8569,40 +8987,13 @@
           <a:p>
             <a:r>
               <a:rPr lang="en-US" sz="800" b="1" dirty="0" smtClean="0"/>
-              <a:t>AMBARI_SERVER</a:t>
-            </a:r>
-            <a:endParaRPr lang="en-US" sz="800" b="1" dirty="0"/>
-          </a:p>
-          <a:p>
-            <a:r>
-              <a:rPr lang="en-US" sz="800" b="1" dirty="0"/>
-              <a:t>METRICS_COLLECTOR</a:t>
-            </a:r>
-          </a:p>
-          <a:p>
-            <a:r>
-              <a:rPr lang="en-US" sz="800" b="1" smtClean="0"/>
-              <a:t>METRICS_GRAFANA</a:t>
-            </a:r>
-            <a:endParaRPr lang="en-US" sz="800" b="1" dirty="0"/>
-          </a:p>
-          <a:p>
-            <a:r>
-              <a:rPr lang="en-US" sz="800" b="1" dirty="0"/>
-              <a:t>FREEIPA_SERVER</a:t>
-            </a:r>
-            <a:endParaRPr lang="en-US" sz="800" b="1" i="1" dirty="0"/>
-          </a:p>
-          <a:p>
-            <a:r>
-              <a:rPr lang="en-US" sz="800" i="1" dirty="0"/>
+              <a:t>MONGODB_MASTER</a:t>
+            </a:r>
+          </a:p>
+          <a:p>
+            <a:r>
+              <a:rPr lang="en-US" sz="800" i="1" dirty="0" smtClean="0"/>
               <a:t>FREEIPA_CLIENT</a:t>
-            </a:r>
-          </a:p>
-          <a:p>
-            <a:r>
-              <a:rPr lang="nl-NL" sz="800" i="1" dirty="0"/>
-              <a:t>METRICS_MONITOR</a:t>
             </a:r>
             <a:endParaRPr lang="en-US" sz="800" i="1" dirty="0"/>
           </a:p>
@@ -8612,68 +9003,17 @@
               <a:t>ZOOKEEPER_CLIENT</a:t>
             </a:r>
           </a:p>
-        </p:txBody>
-      </p:sp>
-      <p:sp>
-        <p:nvSpPr>
-          <p:cNvPr id="23" name="Flowchart: Process 22"/>
-          <p:cNvSpPr/>
-          <p:nvPr/>
-        </p:nvSpPr>
-        <p:spPr>
-          <a:xfrm>
-            <a:off x="6219409" y="4547066"/>
-            <a:ext cx="1335203" cy="1171074"/>
-          </a:xfrm>
-          <a:prstGeom prst="flowChartProcess">
-            <a:avLst/>
-          </a:prstGeom>
-          <a:ln w="28575"/>
-        </p:spPr>
-        <p:style>
-          <a:lnRef idx="2">
-            <a:schemeClr val="accent6"/>
-          </a:lnRef>
-          <a:fillRef idx="1">
-            <a:schemeClr val="lt1"/>
-          </a:fillRef>
-          <a:effectRef idx="0">
-            <a:schemeClr val="accent6"/>
-          </a:effectRef>
-          <a:fontRef idx="minor">
-            <a:schemeClr val="dk1"/>
-          </a:fontRef>
-        </p:style>
-        <p:txBody>
-          <a:bodyPr rtlCol="0" anchor="t"/>
-          <a:lstStyle/>
-          <a:p>
-            <a:pPr algn="ctr"/>
-            <a:r>
-              <a:rPr lang="en-US" sz="800" b="1" dirty="0" smtClean="0"/>
-              <a:t>mongo.kave.org</a:t>
-            </a:r>
-          </a:p>
-          <a:p>
-            <a:endParaRPr lang="en-US" sz="800" dirty="0" smtClean="0"/>
-          </a:p>
-          <a:p>
-            <a:r>
-              <a:rPr lang="en-US" sz="800" b="1" dirty="0" smtClean="0"/>
-              <a:t>MONGODB_MASTER</a:t>
-            </a:r>
+          <a:p>
+            <a:r>
+              <a:rPr lang="nl-NL" sz="800" i="1" dirty="0"/>
+              <a:t>KAVEGANGLIA_MONITOR</a:t>
+            </a:r>
+            <a:endParaRPr lang="en-US" sz="800" i="1" dirty="0"/>
           </a:p>
           <a:p>
             <a:r>
               <a:rPr lang="en-US" sz="800" i="1" dirty="0" smtClean="0"/>
-              <a:t>FREEIPA_CLIENT</a:t>
-            </a:r>
-            <a:endParaRPr lang="en-US" sz="800" i="1" dirty="0"/>
-          </a:p>
-          <a:p>
-            <a:r>
-              <a:rPr lang="en-US" sz="800" i="1" dirty="0" smtClean="0"/>
-              <a:t>ZOOKEEPER_CLIENT METRICS_MONITOR</a:t>
+              <a:t>METRICS_MONITOR</a:t>
             </a:r>
             <a:endParaRPr lang="en-US" sz="800" i="1" dirty="0"/>
           </a:p>
@@ -8690,8 +9030,8 @@
         </p:nvCxnSpPr>
         <p:spPr>
           <a:xfrm flipH="1">
-            <a:off x="5916904" y="5132603"/>
-            <a:ext cx="302505" cy="5173"/>
+            <a:off x="5916904" y="5280168"/>
+            <a:ext cx="416153" cy="1000605"/>
           </a:xfrm>
           <a:prstGeom prst="straightConnector1">
             <a:avLst/>
@@ -8783,14 +9123,15 @@
         <p:nvCxnSpPr>
           <p:cNvPr id="52" name="Straight Arrow Connector 51"/>
           <p:cNvCxnSpPr>
+            <a:stCxn id="49" idx="2"/>
             <a:endCxn id="23" idx="0"/>
           </p:cNvCxnSpPr>
           <p:nvPr/>
         </p:nvCxnSpPr>
         <p:spPr>
           <a:xfrm>
-            <a:off x="6887010" y="4269903"/>
-            <a:ext cx="1" cy="277163"/>
+            <a:off x="6809282" y="3980501"/>
+            <a:ext cx="191377" cy="714130"/>
           </a:xfrm>
           <a:prstGeom prst="straightConnector1">
             <a:avLst/>
@@ -8825,8 +9166,8 @@
         </p:nvCxnSpPr>
         <p:spPr>
           <a:xfrm flipH="1">
-            <a:off x="7539966" y="3836911"/>
-            <a:ext cx="355672" cy="710155"/>
+            <a:off x="7624900" y="4134863"/>
+            <a:ext cx="225899" cy="614515"/>
           </a:xfrm>
           <a:prstGeom prst="straightConnector1">
             <a:avLst/>
@@ -8853,9 +9194,207 @@
           </a:fontRef>
         </p:style>
       </p:cxnSp>
+      <p:sp>
+        <p:nvSpPr>
+          <p:cNvPr id="65" name="Flowchart: Process 64"/>
+          <p:cNvSpPr/>
+          <p:nvPr/>
+        </p:nvSpPr>
+        <p:spPr>
+          <a:xfrm>
+            <a:off x="7984945" y="4321902"/>
+            <a:ext cx="1335203" cy="1523757"/>
+          </a:xfrm>
+          <a:prstGeom prst="flowChartProcess">
+            <a:avLst/>
+          </a:prstGeom>
+          <a:ln w="28575"/>
+        </p:spPr>
+        <p:style>
+          <a:lnRef idx="2">
+            <a:schemeClr val="accent6"/>
+          </a:lnRef>
+          <a:fillRef idx="1">
+            <a:schemeClr val="lt1"/>
+          </a:fillRef>
+          <a:effectRef idx="0">
+            <a:schemeClr val="accent6"/>
+          </a:effectRef>
+          <a:fontRef idx="minor">
+            <a:schemeClr val="dk1"/>
+          </a:fontRef>
+        </p:style>
+        <p:txBody>
+          <a:bodyPr rtlCol="0" anchor="t"/>
+          <a:lstStyle/>
+          <a:p>
+            <a:pPr algn="ctr"/>
+            <a:r>
+              <a:rPr lang="en-US" sz="800" b="1" dirty="0" smtClean="0"/>
+              <a:t>ambari.kave.org</a:t>
+            </a:r>
+          </a:p>
+          <a:p>
+            <a:endParaRPr lang="en-US" sz="800" dirty="0" smtClean="0"/>
+          </a:p>
+          <a:p>
+            <a:r>
+              <a:rPr lang="en-US" sz="800" b="1" dirty="0"/>
+              <a:t>AMBARI_SERVER</a:t>
+            </a:r>
+          </a:p>
+          <a:p>
+            <a:r>
+              <a:rPr lang="en-US" sz="800" b="1" dirty="0"/>
+              <a:t>METRICS_COLLECTOR</a:t>
+            </a:r>
+          </a:p>
+          <a:p>
+            <a:r>
+              <a:rPr lang="en-US" sz="800" b="1" dirty="0" smtClean="0"/>
+              <a:t>METRICS_GRAFANA</a:t>
+            </a:r>
+            <a:endParaRPr lang="en-US" sz="800" b="1" dirty="0"/>
+          </a:p>
+          <a:p>
+            <a:r>
+              <a:rPr lang="en-US" sz="800" b="1" dirty="0"/>
+              <a:t>KAVEGANGLIA_SERVER</a:t>
+            </a:r>
+          </a:p>
+          <a:p>
+            <a:r>
+              <a:rPr lang="en-US" sz="800" b="1" dirty="0" smtClean="0"/>
+              <a:t>KAVENAGIOS_SERVER</a:t>
+            </a:r>
+            <a:endParaRPr lang="en-US" sz="800" b="1" i="1" dirty="0"/>
+          </a:p>
+          <a:p>
+            <a:r>
+              <a:rPr lang="en-US" sz="800" i="1" dirty="0"/>
+              <a:t>FREEIPA_CLIENT</a:t>
+            </a:r>
+          </a:p>
+          <a:p>
+            <a:r>
+              <a:rPr lang="nl-NL" sz="800" i="1" dirty="0"/>
+              <a:t>METRICS_MONITOR</a:t>
+            </a:r>
+            <a:endParaRPr lang="en-US" sz="800" i="1" dirty="0"/>
+          </a:p>
+          <a:p>
+            <a:r>
+              <a:rPr lang="en-US" sz="800" i="1" dirty="0"/>
+              <a:t>ZOOKEEPER_CLIENT</a:t>
+            </a:r>
+          </a:p>
+          <a:p>
+            <a:r>
+              <a:rPr lang="nl-NL" sz="800" i="1" dirty="0" smtClean="0"/>
+              <a:t>KAVEGANGLIA_MONITOR</a:t>
+            </a:r>
+            <a:endParaRPr lang="en-US" sz="800" i="1" dirty="0"/>
+          </a:p>
+          <a:p>
+            <a:r>
+              <a:rPr lang="nl-NL" sz="800" i="1" dirty="0" smtClean="0"/>
+              <a:t>KAVENAGIOS_MONITOR</a:t>
+            </a:r>
+            <a:endParaRPr lang="en-US" sz="800" i="1" dirty="0"/>
+          </a:p>
+        </p:txBody>
+      </p:sp>
+      <p:sp>
+        <p:nvSpPr>
+          <p:cNvPr id="66" name="Flowchart: Process 65"/>
+          <p:cNvSpPr/>
+          <p:nvPr/>
+        </p:nvSpPr>
+        <p:spPr>
+          <a:xfrm>
+            <a:off x="7979624" y="5951042"/>
+            <a:ext cx="1335203" cy="1093993"/>
+          </a:xfrm>
+          <a:prstGeom prst="flowChartProcess">
+            <a:avLst/>
+          </a:prstGeom>
+          <a:ln w="28575"/>
+        </p:spPr>
+        <p:style>
+          <a:lnRef idx="2">
+            <a:schemeClr val="accent6"/>
+          </a:lnRef>
+          <a:fillRef idx="1">
+            <a:schemeClr val="lt1"/>
+          </a:fillRef>
+          <a:effectRef idx="0">
+            <a:schemeClr val="accent6"/>
+          </a:effectRef>
+          <a:fontRef idx="minor">
+            <a:schemeClr val="dk1"/>
+          </a:fontRef>
+        </p:style>
+        <p:txBody>
+          <a:bodyPr rtlCol="0" anchor="t"/>
+          <a:lstStyle/>
+          <a:p>
+            <a:pPr algn="ctr"/>
+            <a:r>
+              <a:rPr lang="en-US" sz="800" b="1" dirty="0"/>
+              <a:t>ipa.kave.org</a:t>
+            </a:r>
+          </a:p>
+          <a:p>
+            <a:endParaRPr lang="en-US" sz="1050" dirty="0" smtClean="0"/>
+          </a:p>
+          <a:p>
+            <a:r>
+              <a:rPr lang="en-US" sz="800" b="1" dirty="0" smtClean="0"/>
+              <a:t>FREEIPA_SERVER</a:t>
+            </a:r>
+            <a:endParaRPr lang="en-US" sz="800" b="1" i="1" dirty="0" smtClean="0"/>
+          </a:p>
+          <a:p>
+            <a:r>
+              <a:rPr lang="en-US" sz="800" i="1" dirty="0"/>
+              <a:t>FREEIPA_CLIENT</a:t>
+            </a:r>
+          </a:p>
+          <a:p>
+            <a:r>
+              <a:rPr lang="nl-NL" sz="800" i="1" dirty="0"/>
+              <a:t>METRICS_MONITOR</a:t>
+            </a:r>
+            <a:endParaRPr lang="en-US" sz="800" i="1" dirty="0"/>
+          </a:p>
+          <a:p>
+            <a:r>
+              <a:rPr lang="en-US" sz="800" i="1" dirty="0"/>
+              <a:t>ZOOKEEPER_CLIENT</a:t>
+            </a:r>
+          </a:p>
+          <a:p>
+            <a:r>
+              <a:rPr lang="nl-NL" sz="800" i="1" dirty="0" smtClean="0"/>
+              <a:t>KAVEGANGLIA_MONITOR</a:t>
+            </a:r>
+            <a:endParaRPr lang="en-US" sz="800" i="1" dirty="0"/>
+          </a:p>
+          <a:p>
+            <a:r>
+              <a:rPr lang="nl-NL" sz="800" i="1" dirty="0" smtClean="0"/>
+              <a:t>KAVENAGIOS_MONITOR</a:t>
+            </a:r>
+            <a:endParaRPr lang="en-US" sz="800" i="1" dirty="0"/>
+          </a:p>
+          <a:p>
+            <a:endParaRPr lang="en-US" sz="800" i="1" dirty="0"/>
+          </a:p>
+        </p:txBody>
+      </p:sp>
       <p:pic>
         <p:nvPicPr>
-          <p:cNvPr id="60" name="Picture 59"/>
+          <p:cNvPr id="67" name="Picture 66"/>
           <p:cNvPicPr>
             <a:picLocks noChangeAspect="1"/>
           </p:cNvPicPr>
@@ -8868,7 +9407,7 @@
         </p:blipFill>
         <p:spPr>
           <a:xfrm>
-            <a:off x="7895638" y="3891649"/>
+            <a:off x="6451716" y="6129109"/>
             <a:ext cx="628738" cy="766761"/>
           </a:xfrm>
           <a:prstGeom prst="rect">
@@ -8878,7 +9417,7 @@
       </p:pic>
       <p:pic>
         <p:nvPicPr>
-          <p:cNvPr id="64" name="Picture 63"/>
+          <p:cNvPr id="68" name="Picture 67"/>
           <p:cNvPicPr>
             <a:picLocks noChangeAspect="1"/>
           </p:cNvPicPr>
@@ -8891,7 +9430,7 @@
         </p:blipFill>
         <p:spPr>
           <a:xfrm>
-            <a:off x="8586614" y="3943602"/>
+            <a:off x="7086325" y="6192255"/>
             <a:ext cx="628738" cy="723900"/>
           </a:xfrm>
           <a:prstGeom prst="rect">

</xml_diff>

<commit_message>
Release notes and VersionSchema and ExampleHadoop .pptx and .pngs
</commit_message>
<xml_diff>
--- a/Figs/KaveExamples.pptx
+++ b/Figs/KaveExamples.pptx
@@ -245,7 +245,7 @@
           <a:p>
             <a:fld id="{EB0E6EFB-24B0-4663-B9F1-49AC475DFDDC}" type="datetimeFigureOut">
               <a:rPr lang="en-US" smtClean="0"/>
-              <a:t>1/9/2016</a:t>
+              <a:t>10/3/2016</a:t>
             </a:fld>
             <a:endParaRPr lang="en-US"/>
           </a:p>
@@ -415,7 +415,7 @@
           <a:p>
             <a:fld id="{EB0E6EFB-24B0-4663-B9F1-49AC475DFDDC}" type="datetimeFigureOut">
               <a:rPr lang="en-US" smtClean="0"/>
-              <a:t>1/9/2016</a:t>
+              <a:t>10/3/2016</a:t>
             </a:fld>
             <a:endParaRPr lang="en-US"/>
           </a:p>
@@ -595,7 +595,7 @@
           <a:p>
             <a:fld id="{EB0E6EFB-24B0-4663-B9F1-49AC475DFDDC}" type="datetimeFigureOut">
               <a:rPr lang="en-US" smtClean="0"/>
-              <a:t>1/9/2016</a:t>
+              <a:t>10/3/2016</a:t>
             </a:fld>
             <a:endParaRPr lang="en-US"/>
           </a:p>
@@ -765,7 +765,7 @@
           <a:p>
             <a:fld id="{EB0E6EFB-24B0-4663-B9F1-49AC475DFDDC}" type="datetimeFigureOut">
               <a:rPr lang="en-US" smtClean="0"/>
-              <a:t>1/9/2016</a:t>
+              <a:t>10/3/2016</a:t>
             </a:fld>
             <a:endParaRPr lang="en-US"/>
           </a:p>
@@ -1009,7 +1009,7 @@
           <a:p>
             <a:fld id="{EB0E6EFB-24B0-4663-B9F1-49AC475DFDDC}" type="datetimeFigureOut">
               <a:rPr lang="en-US" smtClean="0"/>
-              <a:t>1/9/2016</a:t>
+              <a:t>10/3/2016</a:t>
             </a:fld>
             <a:endParaRPr lang="en-US"/>
           </a:p>
@@ -1241,7 +1241,7 @@
           <a:p>
             <a:fld id="{EB0E6EFB-24B0-4663-B9F1-49AC475DFDDC}" type="datetimeFigureOut">
               <a:rPr lang="en-US" smtClean="0"/>
-              <a:t>1/9/2016</a:t>
+              <a:t>10/3/2016</a:t>
             </a:fld>
             <a:endParaRPr lang="en-US"/>
           </a:p>
@@ -1608,7 +1608,7 @@
           <a:p>
             <a:fld id="{EB0E6EFB-24B0-4663-B9F1-49AC475DFDDC}" type="datetimeFigureOut">
               <a:rPr lang="en-US" smtClean="0"/>
-              <a:t>1/9/2016</a:t>
+              <a:t>10/3/2016</a:t>
             </a:fld>
             <a:endParaRPr lang="en-US"/>
           </a:p>
@@ -1726,7 +1726,7 @@
           <a:p>
             <a:fld id="{EB0E6EFB-24B0-4663-B9F1-49AC475DFDDC}" type="datetimeFigureOut">
               <a:rPr lang="en-US" smtClean="0"/>
-              <a:t>1/9/2016</a:t>
+              <a:t>10/3/2016</a:t>
             </a:fld>
             <a:endParaRPr lang="en-US"/>
           </a:p>
@@ -1821,7 +1821,7 @@
           <a:p>
             <a:fld id="{EB0E6EFB-24B0-4663-B9F1-49AC475DFDDC}" type="datetimeFigureOut">
               <a:rPr lang="en-US" smtClean="0"/>
-              <a:t>1/9/2016</a:t>
+              <a:t>10/3/2016</a:t>
             </a:fld>
             <a:endParaRPr lang="en-US"/>
           </a:p>
@@ -2098,7 +2098,7 @@
           <a:p>
             <a:fld id="{EB0E6EFB-24B0-4663-B9F1-49AC475DFDDC}" type="datetimeFigureOut">
               <a:rPr lang="en-US" smtClean="0"/>
-              <a:t>1/9/2016</a:t>
+              <a:t>10/3/2016</a:t>
             </a:fld>
             <a:endParaRPr lang="en-US"/>
           </a:p>
@@ -2355,7 +2355,7 @@
           <a:p>
             <a:fld id="{EB0E6EFB-24B0-4663-B9F1-49AC475DFDDC}" type="datetimeFigureOut">
               <a:rPr lang="en-US" smtClean="0"/>
-              <a:t>1/9/2016</a:t>
+              <a:t>10/3/2016</a:t>
             </a:fld>
             <a:endParaRPr lang="en-US"/>
           </a:p>
@@ -2568,7 +2568,7 @@
           <a:p>
             <a:fld id="{EB0E6EFB-24B0-4663-B9F1-49AC475DFDDC}" type="datetimeFigureOut">
               <a:rPr lang="en-US" smtClean="0"/>
-              <a:t>1/9/2016</a:t>
+              <a:t>10/3/2016</a:t>
             </a:fld>
             <a:endParaRPr lang="en-US"/>
           </a:p>
@@ -2982,7 +2982,7 @@
         <p:spPr>
           <a:xfrm>
             <a:off x="3689838" y="1460787"/>
-            <a:ext cx="3370245" cy="3688981"/>
+            <a:ext cx="3370245" cy="5022481"/>
           </a:xfrm>
           <a:prstGeom prst="flowChartProcess">
             <a:avLst/>
@@ -3024,7 +3024,7 @@
         <p:spPr>
           <a:xfrm>
             <a:off x="3949024" y="1794508"/>
-            <a:ext cx="1335203" cy="1257867"/>
+            <a:ext cx="1335203" cy="1833613"/>
           </a:xfrm>
           <a:prstGeom prst="flowChartProcess">
             <a:avLst/>
@@ -3101,6 +3101,33 @@
               <a:rPr lang="nl-NL" sz="800" i="1" dirty="0" smtClean="0"/>
               <a:t>KAVEGANGLIA_MONITOR</a:t>
             </a:r>
+          </a:p>
+          <a:p>
+            <a:r>
+              <a:rPr lang="en-US" sz="800" dirty="0" smtClean="0"/>
+              <a:t>ZEPPELIN_MASTER</a:t>
+            </a:r>
+          </a:p>
+          <a:p>
+            <a:r>
+              <a:rPr lang="en-US" sz="800" dirty="0" smtClean="0"/>
+              <a:t>SLIDER</a:t>
+            </a:r>
+          </a:p>
+          <a:p>
+            <a:r>
+              <a:rPr lang="en-US" sz="800" dirty="0" smtClean="0"/>
+              <a:t>INFRA_SOLR_CLIENT</a:t>
+            </a:r>
+          </a:p>
+          <a:p>
+            <a:r>
+              <a:rPr lang="en-US" sz="800" dirty="0" smtClean="0"/>
+              <a:t>LOGSEARCH_LOGFEEDER</a:t>
+            </a:r>
+            <a:endParaRPr lang="nl-NL" sz="800" i="1" dirty="0" smtClean="0"/>
+          </a:p>
+          <a:p>
             <a:endParaRPr lang="en-US" sz="800" i="1" dirty="0"/>
           </a:p>
         </p:txBody>
@@ -3113,8 +3140,8 @@
         </p:nvSpPr>
         <p:spPr>
           <a:xfrm>
-            <a:off x="5504553" y="1794509"/>
-            <a:ext cx="1335203" cy="1523656"/>
+            <a:off x="5504553" y="1794508"/>
+            <a:ext cx="1335203" cy="2110741"/>
           </a:xfrm>
           <a:prstGeom prst="flowChartProcess">
             <a:avLst/>
@@ -3201,9 +3228,40 @@
           </a:p>
           <a:p>
             <a:r>
-              <a:rPr lang="en-US" sz="800" i="1" dirty="0"/>
+              <a:rPr lang="en-US" sz="800" i="1" dirty="0" smtClean="0"/>
               <a:t>ZOOKEEPER_CLIENT</a:t>
             </a:r>
+          </a:p>
+          <a:p>
+            <a:r>
+              <a:rPr lang="en-US" sz="800" dirty="0" smtClean="0"/>
+              <a:t>SLIDER</a:t>
+            </a:r>
+          </a:p>
+          <a:p>
+            <a:r>
+              <a:rPr lang="en-US" sz="800" dirty="0" smtClean="0"/>
+              <a:t>LOGSEARCH_SERVER</a:t>
+            </a:r>
+          </a:p>
+          <a:p>
+            <a:r>
+              <a:rPr lang="en-US" sz="800" dirty="0" smtClean="0"/>
+              <a:t>INFRA_SOLR</a:t>
+            </a:r>
+          </a:p>
+          <a:p>
+            <a:r>
+              <a:rPr lang="en-US" sz="800" dirty="0" smtClean="0"/>
+              <a:t>INFRA_SOLR_CLIENT</a:t>
+            </a:r>
+          </a:p>
+          <a:p>
+            <a:r>
+              <a:rPr lang="en-US" sz="800" dirty="0"/>
+              <a:t>LOGSEARCH_LOGFEEDER</a:t>
+            </a:r>
+            <a:endParaRPr lang="en-US" sz="800" i="1" dirty="0"/>
           </a:p>
         </p:txBody>
       </p:sp>
@@ -3215,8 +3273,8 @@
         </p:nvSpPr>
         <p:spPr>
           <a:xfrm>
-            <a:off x="3956879" y="3177962"/>
-            <a:ext cx="1335203" cy="1837124"/>
+            <a:off x="3937062" y="3763483"/>
+            <a:ext cx="1335203" cy="2251780"/>
           </a:xfrm>
           <a:prstGeom prst="flowChartProcess">
             <a:avLst/>
@@ -3248,9 +3306,6 @@
             </a:r>
           </a:p>
           <a:p>
-            <a:endParaRPr lang="en-US" sz="1050" dirty="0" smtClean="0"/>
-          </a:p>
-          <a:p>
             <a:r>
               <a:rPr lang="en-US" sz="800" b="1" dirty="0" smtClean="0"/>
               <a:t>GITLAB_SERVER</a:t>
@@ -3324,8 +3379,26 @@
           </a:p>
           <a:p>
             <a:r>
-              <a:rPr lang="en-US" sz="800" i="1" dirty="0"/>
+              <a:rPr lang="en-US" sz="800" i="1" dirty="0" smtClean="0"/>
               <a:t>ZOOKEEPER_CLIENT</a:t>
+            </a:r>
+          </a:p>
+          <a:p>
+            <a:r>
+              <a:rPr lang="en-US" sz="800" dirty="0" smtClean="0"/>
+              <a:t>SLIDER</a:t>
+            </a:r>
+          </a:p>
+          <a:p>
+            <a:r>
+              <a:rPr lang="en-US" sz="800" dirty="0" smtClean="0"/>
+              <a:t>INFRA_SOLR_CLIENT</a:t>
+            </a:r>
+          </a:p>
+          <a:p>
+            <a:r>
+              <a:rPr lang="en-US" sz="800" dirty="0" smtClean="0"/>
+              <a:t>LOGSEARCH_LOGFEEDER</a:t>
             </a:r>
           </a:p>
         </p:txBody>
@@ -3342,7 +3415,7 @@
         <p:spPr>
           <a:xfrm>
             <a:off x="3508648" y="2421170"/>
-            <a:ext cx="440376" cy="2272"/>
+            <a:ext cx="440376" cy="290145"/>
           </a:xfrm>
           <a:prstGeom prst="line">
             <a:avLst/>
@@ -3519,9 +3592,9 @@
         </p:nvGrpSpPr>
         <p:grpSpPr>
           <a:xfrm>
-            <a:off x="654583" y="3518023"/>
+            <a:off x="568858" y="3518023"/>
             <a:ext cx="1507947" cy="1157002"/>
-            <a:chOff x="160215" y="3653895"/>
+            <a:chOff x="74490" y="3653895"/>
             <a:chExt cx="1507947" cy="1157002"/>
           </a:xfrm>
         </p:grpSpPr>
@@ -3574,7 +3647,7 @@
           </p:nvSpPr>
           <p:spPr>
             <a:xfrm>
-              <a:off x="160215" y="3653895"/>
+              <a:off x="74490" y="3653895"/>
               <a:ext cx="1507947" cy="1157002"/>
             </a:xfrm>
             <a:prstGeom prst="flowChartProcess">
@@ -3698,7 +3771,7 @@
         </p:nvCxnSpPr>
         <p:spPr>
           <a:xfrm flipV="1">
-            <a:off x="2162530" y="2470451"/>
+            <a:off x="2076805" y="2470451"/>
             <a:ext cx="853354" cy="1626073"/>
           </a:xfrm>
           <a:prstGeom prst="line">
@@ -3756,15 +3829,13 @@
       <p:cxnSp>
         <p:nvCxnSpPr>
           <p:cNvPr id="25" name="Straight Arrow Connector 24"/>
-          <p:cNvCxnSpPr>
-            <a:stCxn id="9" idx="2"/>
-          </p:cNvCxnSpPr>
+          <p:cNvCxnSpPr/>
           <p:nvPr/>
         </p:nvCxnSpPr>
         <p:spPr>
           <a:xfrm flipH="1">
-            <a:off x="4620491" y="5015086"/>
-            <a:ext cx="3990" cy="468403"/>
+            <a:off x="4600674" y="6024788"/>
+            <a:ext cx="3990" cy="1215798"/>
           </a:xfrm>
           <a:prstGeom prst="straightConnector1">
             <a:avLst/>
@@ -3799,8 +3870,8 @@
         </p:nvSpPr>
         <p:spPr>
           <a:xfrm>
-            <a:off x="4686719" y="5150766"/>
-            <a:ext cx="1075679" cy="461665"/>
+            <a:off x="5386357" y="5267028"/>
+            <a:ext cx="1075679" cy="646331"/>
           </a:xfrm>
           <a:prstGeom prst="rect">
             <a:avLst/>
@@ -3831,6 +3902,9 @@
               <a:rPr lang="en-US" sz="1200" dirty="0" smtClean="0"/>
               <a:t>?</a:t>
             </a:r>
+          </a:p>
+          <a:p>
+            <a:endParaRPr lang="en-US" sz="1200" dirty="0" smtClean="0"/>
           </a:p>
         </p:txBody>
       </p:sp>
@@ -4543,7 +4617,7 @@
         </p:nvSpPr>
         <p:spPr>
           <a:xfrm>
-            <a:off x="5505482" y="3373585"/>
+            <a:off x="5514838" y="4040902"/>
             <a:ext cx="1335203" cy="1011379"/>
           </a:xfrm>
           <a:prstGeom prst="flowChartProcess">
@@ -4574,7 +4648,6 @@
               <a:rPr lang="en-US" sz="1050" b="1" dirty="0" smtClean="0"/>
               <a:t>ipa.kave.org</a:t>
             </a:r>
-            <a:endParaRPr lang="en-US" sz="1050" b="1" dirty="0" smtClean="0"/>
           </a:p>
           <a:p>
             <a:endParaRPr lang="en-US" sz="1050" dirty="0" smtClean="0"/>
@@ -4632,7 +4705,7 @@
         </p:blipFill>
         <p:spPr>
           <a:xfrm>
-            <a:off x="5527898" y="4373916"/>
+            <a:off x="5527898" y="5764566"/>
             <a:ext cx="628738" cy="766761"/>
           </a:xfrm>
           <a:prstGeom prst="rect">
@@ -4655,7 +4728,7 @@
         </p:blipFill>
         <p:spPr>
           <a:xfrm>
-            <a:off x="6218874" y="4425869"/>
+            <a:off x="6218874" y="5759369"/>
             <a:ext cx="628738" cy="723900"/>
           </a:xfrm>
           <a:prstGeom prst="rect">
@@ -4673,6 +4746,13 @@
   <p:clrMapOvr>
     <a:masterClrMapping/>
   </p:clrMapOvr>
+  <p:timing>
+    <p:tnLst>
+      <p:par>
+        <p:cTn id="1" dur="indefinite" restart="never" nodeType="tmRoot"/>
+      </p:par>
+    </p:tnLst>
+  </p:timing>
 </p:sld>
 </file>
 
@@ -4701,8 +4781,8 @@
         </p:nvSpPr>
         <p:spPr>
           <a:xfrm>
-            <a:off x="3333871" y="1282912"/>
-            <a:ext cx="4912205" cy="5131743"/>
+            <a:off x="3370380" y="356424"/>
+            <a:ext cx="4912205" cy="6187251"/>
           </a:xfrm>
           <a:prstGeom prst="flowChartProcess">
             <a:avLst/>
@@ -4743,8 +4823,8 @@
         </p:nvSpPr>
         <p:spPr>
           <a:xfrm>
-            <a:off x="5043055" y="1581501"/>
-            <a:ext cx="3089563" cy="3388881"/>
+            <a:off x="5064147" y="478320"/>
+            <a:ext cx="3089563" cy="5933623"/>
           </a:xfrm>
           <a:prstGeom prst="rect">
             <a:avLst/>
@@ -4783,8 +4863,8 @@
         </p:nvSpPr>
         <p:spPr>
           <a:xfrm>
-            <a:off x="3566656" y="1339004"/>
-            <a:ext cx="1335203" cy="2202636"/>
+            <a:off x="3557885" y="502557"/>
+            <a:ext cx="1335203" cy="2632922"/>
           </a:xfrm>
           <a:prstGeom prst="flowChartProcess">
             <a:avLst/>
@@ -4911,6 +4991,26 @@
               <a:rPr lang="en-US" sz="800" i="1" dirty="0" smtClean="0"/>
               <a:t>METRICS_MONITOR</a:t>
             </a:r>
+          </a:p>
+          <a:p>
+            <a:r>
+              <a:rPr lang="en-US" sz="800" dirty="0"/>
+              <a:t>SLIDER</a:t>
+            </a:r>
+          </a:p>
+          <a:p>
+            <a:r>
+              <a:rPr lang="en-US" sz="800" dirty="0"/>
+              <a:t>INFRA_SOLR_CLIENT</a:t>
+            </a:r>
+          </a:p>
+          <a:p>
+            <a:r>
+              <a:rPr lang="en-US" sz="800" dirty="0"/>
+              <a:t>LOGSEARCH_LOGFEEDER</a:t>
+            </a:r>
+          </a:p>
+          <a:p>
             <a:endParaRPr lang="en-US" sz="800" i="1" dirty="0" smtClean="0"/>
           </a:p>
           <a:p>
@@ -4927,8 +5027,8 @@
         </p:nvSpPr>
         <p:spPr>
           <a:xfrm>
-            <a:off x="6707822" y="5051521"/>
-            <a:ext cx="1335203" cy="1298277"/>
+            <a:off x="6637925" y="4029449"/>
+            <a:ext cx="1335203" cy="1920606"/>
           </a:xfrm>
           <a:prstGeom prst="flowChartProcess">
             <a:avLst/>
@@ -5009,9 +5109,42 @@
           </a:p>
           <a:p>
             <a:r>
-              <a:rPr lang="nl-NL" sz="800" i="1" dirty="0"/>
+              <a:rPr lang="nl-NL" sz="800" i="1" dirty="0" smtClean="0"/>
               <a:t>KAVEGANGLIA_MONITOR</a:t>
             </a:r>
+          </a:p>
+          <a:p>
+            <a:r>
+              <a:rPr lang="en-US" sz="800" dirty="0"/>
+              <a:t>SLIDER</a:t>
+            </a:r>
+          </a:p>
+          <a:p>
+            <a:r>
+              <a:rPr lang="en-US" sz="800" dirty="0"/>
+              <a:t>LOGSEARCH_SERVER</a:t>
+            </a:r>
+          </a:p>
+          <a:p>
+            <a:r>
+              <a:rPr lang="en-US" sz="800" dirty="0"/>
+              <a:t>INFRA_SOLR</a:t>
+            </a:r>
+          </a:p>
+          <a:p>
+            <a:r>
+              <a:rPr lang="en-US" sz="800" dirty="0"/>
+              <a:t>INFRA_SOLR_CLIENT</a:t>
+            </a:r>
+          </a:p>
+          <a:p>
+            <a:r>
+              <a:rPr lang="en-US" sz="800" dirty="0"/>
+              <a:t>LOGSEARCH_LOGFEEDER</a:t>
+            </a:r>
+            <a:endParaRPr lang="en-US" sz="800" i="1" dirty="0"/>
+          </a:p>
+          <a:p>
             <a:endParaRPr lang="en-US" sz="800" i="1" dirty="0"/>
           </a:p>
         </p:txBody>
@@ -5026,9 +5159,9 @@
           <p:nvPr/>
         </p:nvCxnSpPr>
         <p:spPr>
-          <a:xfrm>
-            <a:off x="3174104" y="2403463"/>
-            <a:ext cx="392552" cy="36859"/>
+          <a:xfrm flipV="1">
+            <a:off x="3174104" y="1819018"/>
+            <a:ext cx="383781" cy="584445"/>
           </a:xfrm>
           <a:prstGeom prst="line">
             <a:avLst/>
@@ -5064,8 +5197,8 @@
         </p:nvSpPr>
         <p:spPr>
           <a:xfrm>
-            <a:off x="5123440" y="1646596"/>
-            <a:ext cx="1335203" cy="3250986"/>
+            <a:off x="5123440" y="875071"/>
+            <a:ext cx="1335203" cy="3622375"/>
           </a:xfrm>
           <a:prstGeom prst="flowChartProcess">
             <a:avLst/>
@@ -5135,7 +5268,6 @@
               <a:rPr lang="en-US" sz="800" b="1" dirty="0" smtClean="0"/>
               <a:t>PIG</a:t>
             </a:r>
-            <a:endParaRPr lang="en-US" sz="800" b="1" dirty="0" smtClean="0"/>
           </a:p>
           <a:p>
             <a:r>
@@ -5253,6 +5385,22 @@
             <a:endParaRPr lang="en-US" sz="800" i="1" dirty="0"/>
           </a:p>
           <a:p>
+            <a:r>
+              <a:rPr lang="en-US" sz="800" dirty="0" smtClean="0"/>
+              <a:t>SLIDER</a:t>
+            </a:r>
+          </a:p>
+          <a:p>
+            <a:r>
+              <a:rPr lang="en-US" sz="800" dirty="0" smtClean="0"/>
+              <a:t>INFRA_SOLR_CLIENT</a:t>
+            </a:r>
+          </a:p>
+          <a:p>
+            <a:r>
+              <a:rPr lang="en-US" sz="800" dirty="0"/>
+              <a:t>LOGSEARCH_LOGFEEDER</a:t>
+            </a:r>
             <a:endParaRPr lang="en-US" sz="800" dirty="0" smtClean="0"/>
           </a:p>
         </p:txBody>
@@ -5265,8 +5413,8 @@
         </p:nvSpPr>
         <p:spPr>
           <a:xfrm>
-            <a:off x="6622097" y="1973035"/>
-            <a:ext cx="1335203" cy="1171074"/>
+            <a:off x="6637925" y="866518"/>
+            <a:ext cx="1335203" cy="1418913"/>
           </a:xfrm>
           <a:prstGeom prst="flowChartProcess">
             <a:avLst/>
@@ -5338,6 +5486,18 @@
               <a:rPr lang="en-US" sz="800" i="1" dirty="0" smtClean="0"/>
               <a:t>METRICS_MONITOR</a:t>
             </a:r>
+          </a:p>
+          <a:p>
+            <a:r>
+              <a:rPr lang="en-US" sz="800" dirty="0" smtClean="0"/>
+              <a:t>INFRA_SOLR_CLIENT</a:t>
+            </a:r>
+          </a:p>
+          <a:p>
+            <a:r>
+              <a:rPr lang="en-US" sz="800" dirty="0"/>
+              <a:t>LOGSEARCH_LOGFEEDER</a:t>
+            </a:r>
             <a:endParaRPr lang="en-US" sz="800" i="1" dirty="0"/>
           </a:p>
         </p:txBody>
@@ -5350,8 +5510,8 @@
         </p:nvSpPr>
         <p:spPr>
           <a:xfrm>
-            <a:off x="6622097" y="3523114"/>
-            <a:ext cx="1335203" cy="1171074"/>
+            <a:off x="6654259" y="2367199"/>
+            <a:ext cx="1335203" cy="1452325"/>
           </a:xfrm>
           <a:prstGeom prst="flowChartProcess">
             <a:avLst/>
@@ -5401,8 +5561,8 @@
         </p:nvSpPr>
         <p:spPr>
           <a:xfrm>
-            <a:off x="6669941" y="3568583"/>
-            <a:ext cx="1335203" cy="1171074"/>
+            <a:off x="6697218" y="2403463"/>
+            <a:ext cx="1335203" cy="1494254"/>
           </a:xfrm>
           <a:prstGeom prst="flowChartProcess">
             <a:avLst/>
@@ -5452,8 +5612,8 @@
         </p:nvSpPr>
         <p:spPr>
           <a:xfrm>
-            <a:off x="6714172" y="3618364"/>
-            <a:ext cx="1335203" cy="1171074"/>
+            <a:off x="6736021" y="2429536"/>
+            <a:ext cx="1335203" cy="1523149"/>
           </a:xfrm>
           <a:prstGeom prst="flowChartProcess">
             <a:avLst/>
@@ -5527,6 +5687,25 @@
               <a:rPr lang="en-US" sz="800" i="1" dirty="0" smtClean="0"/>
               <a:t>FREEIPA_CLIENT</a:t>
             </a:r>
+          </a:p>
+          <a:p>
+            <a:r>
+              <a:rPr lang="en-US" sz="800" dirty="0" smtClean="0"/>
+              <a:t>SLIDER</a:t>
+            </a:r>
+          </a:p>
+          <a:p>
+            <a:r>
+              <a:rPr lang="en-US" sz="800" dirty="0" smtClean="0"/>
+              <a:t>INFRA_SOLR_CLIENT</a:t>
+            </a:r>
+          </a:p>
+          <a:p>
+            <a:r>
+              <a:rPr lang="en-US" sz="800" dirty="0"/>
+              <a:t>LOGSEARCH_LOGFEEDER</a:t>
+            </a:r>
+            <a:endParaRPr lang="en-US" sz="800" i="1" dirty="0" smtClean="0"/>
           </a:p>
           <a:p>
             <a:endParaRPr lang="en-US" sz="800" dirty="0" smtClean="0"/>
@@ -6070,8 +6249,8 @@
         </p:nvSpPr>
         <p:spPr>
           <a:xfrm>
-            <a:off x="3554112" y="3612647"/>
-            <a:ext cx="1335203" cy="2737152"/>
+            <a:off x="3549662" y="3239061"/>
+            <a:ext cx="1335203" cy="3172882"/>
           </a:xfrm>
           <a:prstGeom prst="flowChartProcess">
             <a:avLst/>
@@ -6232,6 +6411,27 @@
               <a:rPr lang="en-US" sz="800" i="1" dirty="0" smtClean="0"/>
               <a:t>METRICS_MONITOR</a:t>
             </a:r>
+          </a:p>
+          <a:p>
+            <a:r>
+              <a:rPr lang="en-US" sz="800" dirty="0"/>
+              <a:t>SLIDER</a:t>
+            </a:r>
+          </a:p>
+          <a:p>
+            <a:r>
+              <a:rPr lang="en-US" sz="800" dirty="0"/>
+              <a:t>INFRA_SOLR_CLIENT</a:t>
+            </a:r>
+          </a:p>
+          <a:p>
+            <a:r>
+              <a:rPr lang="en-US" sz="800" dirty="0"/>
+              <a:t>LOGSEARCH_LOGFEEDER</a:t>
+            </a:r>
+            <a:endParaRPr lang="en-US" sz="800" i="1" dirty="0"/>
+          </a:p>
+          <a:p>
             <a:endParaRPr lang="en-US" sz="800" i="1" dirty="0"/>
           </a:p>
         </p:txBody>
@@ -6244,7 +6444,7 @@
         </p:nvSpPr>
         <p:spPr>
           <a:xfrm>
-            <a:off x="7442363" y="1542019"/>
+            <a:off x="7433002" y="473336"/>
             <a:ext cx="678391" cy="276999"/>
           </a:xfrm>
           <a:prstGeom prst="rect">
@@ -6282,7 +6482,7 @@
         </p:nvSpPr>
         <p:spPr>
           <a:xfrm>
-            <a:off x="5259078" y="1223270"/>
+            <a:off x="5149721" y="473336"/>
             <a:ext cx="1691425" cy="369332"/>
           </a:xfrm>
           <a:prstGeom prst="rect">
@@ -6417,7 +6617,7 @@
         </p:nvSpPr>
         <p:spPr>
           <a:xfrm>
-            <a:off x="5218005" y="5068636"/>
+            <a:off x="5123440" y="4541575"/>
             <a:ext cx="1335203" cy="1011379"/>
           </a:xfrm>
           <a:prstGeom prst="flowChartProcess">
@@ -6500,6 +6700,13 @@
   <p:clrMapOvr>
     <a:masterClrMapping/>
   </p:clrMapOvr>
+  <p:timing>
+    <p:tnLst>
+      <p:par>
+        <p:cTn id="1" dur="indefinite" restart="never" nodeType="tmRoot"/>
+      </p:par>
+    </p:tnLst>
+  </p:timing>
 </p:sld>
 </file>
 
@@ -6528,8 +6735,8 @@
         </p:nvSpPr>
         <p:spPr>
           <a:xfrm>
-            <a:off x="2713793" y="474832"/>
-            <a:ext cx="6672662" cy="6632550"/>
+            <a:off x="2543513" y="44024"/>
+            <a:ext cx="6672662" cy="6830843"/>
           </a:xfrm>
           <a:prstGeom prst="flowChartProcess">
             <a:avLst/>
@@ -6569,8 +6776,8 @@
         </p:nvSpPr>
         <p:spPr>
           <a:xfrm>
-            <a:off x="2823322" y="536582"/>
-            <a:ext cx="1335203" cy="2635209"/>
+            <a:off x="2823322" y="127007"/>
+            <a:ext cx="1335203" cy="2968618"/>
           </a:xfrm>
           <a:prstGeom prst="flowChartProcess">
             <a:avLst/>
@@ -6706,8 +6913,8 @@
         </p:nvSpPr>
         <p:spPr>
           <a:xfrm>
-            <a:off x="2886780" y="598122"/>
-            <a:ext cx="1335203" cy="2635209"/>
+            <a:off x="2886780" y="179022"/>
+            <a:ext cx="1335203" cy="2992803"/>
           </a:xfrm>
           <a:prstGeom prst="flowChartProcess">
             <a:avLst/>
@@ -6752,7 +6959,7 @@
         </p:nvSpPr>
         <p:spPr>
           <a:xfrm>
-            <a:off x="4476913" y="5632365"/>
+            <a:off x="4423056" y="4584213"/>
             <a:ext cx="1544781" cy="1465443"/>
           </a:xfrm>
           <a:prstGeom prst="rect">
@@ -6795,7 +7002,7 @@
         </p:nvSpPr>
         <p:spPr>
           <a:xfrm>
-            <a:off x="7617057" y="826181"/>
+            <a:off x="7588652" y="350276"/>
             <a:ext cx="1672415" cy="3431687"/>
           </a:xfrm>
           <a:prstGeom prst="rect">
@@ -6872,7 +7079,7 @@
         </p:nvSpPr>
         <p:spPr>
           <a:xfrm>
-            <a:off x="7789068" y="979317"/>
+            <a:off x="7788722" y="606272"/>
             <a:ext cx="1335203" cy="1664091"/>
           </a:xfrm>
           <a:prstGeom prst="flowChartProcess">
@@ -6988,10 +7195,10 @@
         </p:nvGrpSpPr>
         <p:grpSpPr>
           <a:xfrm>
-            <a:off x="7765074" y="2733810"/>
-            <a:ext cx="1420928" cy="1401053"/>
-            <a:chOff x="5186863" y="3041531"/>
-            <a:chExt cx="1420928" cy="1266324"/>
+            <a:off x="7765074" y="2343291"/>
+            <a:ext cx="1420928" cy="1401049"/>
+            <a:chOff x="5186863" y="2688562"/>
+            <a:chExt cx="1420928" cy="1266320"/>
           </a:xfrm>
         </p:grpSpPr>
         <p:sp>
@@ -7002,7 +7209,7 @@
           </p:nvSpPr>
           <p:spPr>
             <a:xfrm>
-              <a:off x="5186863" y="3041531"/>
+              <a:off x="5186863" y="2688562"/>
               <a:ext cx="1335203" cy="1171074"/>
             </a:xfrm>
             <a:prstGeom prst="flowChartProcess">
@@ -7053,7 +7260,7 @@
           </p:nvSpPr>
           <p:spPr>
             <a:xfrm>
-              <a:off x="5231532" y="3087000"/>
+              <a:off x="5222007" y="2742640"/>
               <a:ext cx="1335203" cy="1171074"/>
             </a:xfrm>
             <a:prstGeom prst="flowChartProcess">
@@ -7104,7 +7311,7 @@
           </p:nvSpPr>
           <p:spPr>
             <a:xfrm>
-              <a:off x="5272588" y="3136781"/>
+              <a:off x="5272588" y="2783808"/>
               <a:ext cx="1335203" cy="1171074"/>
             </a:xfrm>
             <a:prstGeom prst="flowChartProcess">
@@ -7208,7 +7415,7 @@
         </p:nvSpPr>
         <p:spPr>
           <a:xfrm>
-            <a:off x="4581701" y="5695236"/>
+            <a:off x="4517414" y="4697575"/>
             <a:ext cx="1335203" cy="1171074"/>
           </a:xfrm>
           <a:prstGeom prst="flowChartProcess">
@@ -7248,7 +7455,6 @@
               <a:rPr lang="en-US" sz="800" b="1" dirty="0" smtClean="0"/>
               <a:t>WILDFLY_APP_MASTER</a:t>
             </a:r>
-            <a:endParaRPr lang="en-US" sz="800" b="1" dirty="0" smtClean="0"/>
           </a:p>
           <a:p>
             <a:r>
@@ -7303,7 +7509,7 @@
         </p:nvCxnSpPr>
         <p:spPr>
           <a:xfrm>
-            <a:off x="5249303" y="6866310"/>
+            <a:off x="5185016" y="5868649"/>
             <a:ext cx="15424" cy="518163"/>
           </a:xfrm>
           <a:prstGeom prst="straightConnector1">
@@ -7902,10 +8108,10 @@
         </p:nvGrpSpPr>
         <p:grpSpPr>
           <a:xfrm>
-            <a:off x="4476913" y="746015"/>
-            <a:ext cx="3089563" cy="3712494"/>
-            <a:chOff x="4724927" y="1437222"/>
-            <a:chExt cx="3089563" cy="3712494"/>
+            <a:off x="4428842" y="308209"/>
+            <a:ext cx="3089563" cy="4080984"/>
+            <a:chOff x="4724927" y="1475322"/>
+            <a:chExt cx="3089563" cy="4080984"/>
           </a:xfrm>
         </p:grpSpPr>
         <p:sp>
@@ -7916,8 +8122,8 @@
           </p:nvSpPr>
           <p:spPr>
             <a:xfrm>
-              <a:off x="4724927" y="1517390"/>
-              <a:ext cx="3089563" cy="3632326"/>
+              <a:off x="4724927" y="1517389"/>
+              <a:ext cx="3089563" cy="4038917"/>
             </a:xfrm>
             <a:prstGeom prst="rect">
               <a:avLst/>
@@ -7957,7 +8163,7 @@
           <p:spPr>
             <a:xfrm>
               <a:off x="4805312" y="1596119"/>
-              <a:ext cx="1335203" cy="3480181"/>
+              <a:ext cx="1335203" cy="3861064"/>
             </a:xfrm>
             <a:prstGeom prst="flowChartProcess">
               <a:avLst/>
@@ -8128,7 +8334,6 @@
                 <a:rPr lang="en-US" sz="800" i="1" dirty="0"/>
                 <a:t>ZOOKEEPER_CLIENT </a:t>
               </a:r>
-              <a:endParaRPr lang="en-US" sz="800" i="1" dirty="0"/>
             </a:p>
             <a:p>
               <a:r>
@@ -8156,6 +8361,26 @@
                 <a:rPr lang="en-US" sz="800" i="1" dirty="0" smtClean="0"/>
                 <a:t>FREEIPA_CLIENT</a:t>
               </a:r>
+            </a:p>
+            <a:p>
+              <a:r>
+                <a:rPr lang="en-US" sz="800" dirty="0"/>
+                <a:t>SLIDER</a:t>
+              </a:r>
+            </a:p>
+            <a:p>
+              <a:r>
+                <a:rPr lang="en-US" sz="800" dirty="0"/>
+                <a:t>INFRA_SOLR_CLIENT</a:t>
+              </a:r>
+            </a:p>
+            <a:p>
+              <a:r>
+                <a:rPr lang="en-US" sz="800" dirty="0"/>
+                <a:t>LOGSEARCH_LOGFEEDER</a:t>
+              </a:r>
+            </a:p>
+            <a:p>
               <a:endParaRPr lang="en-US" sz="800" i="1" dirty="0"/>
             </a:p>
           </p:txBody>
@@ -8271,7 +8496,7 @@
           <p:spPr>
             <a:xfrm>
               <a:off x="6288729" y="3261793"/>
-              <a:ext cx="1335203" cy="1314665"/>
+              <a:ext cx="1335203" cy="1942841"/>
             </a:xfrm>
             <a:prstGeom prst="flowChartProcess">
               <a:avLst/>
@@ -8321,8 +8546,8 @@
           </p:nvSpPr>
           <p:spPr>
             <a:xfrm>
-              <a:off x="6339113" y="3307262"/>
-              <a:ext cx="1335203" cy="1314665"/>
+              <a:off x="6358976" y="3319925"/>
+              <a:ext cx="1335203" cy="1921896"/>
             </a:xfrm>
             <a:prstGeom prst="flowChartProcess">
               <a:avLst/>
@@ -8372,8 +8597,8 @@
           </p:nvSpPr>
           <p:spPr>
             <a:xfrm>
-              <a:off x="6389694" y="3357043"/>
-              <a:ext cx="1335203" cy="1314665"/>
+              <a:off x="6431821" y="3374533"/>
+              <a:ext cx="1335203" cy="1947455"/>
             </a:xfrm>
             <a:prstGeom prst="flowChartProcess">
               <a:avLst/>
@@ -8460,6 +8685,27 @@
               </a:r>
             </a:p>
             <a:p>
+              <a:r>
+                <a:rPr lang="en-US" sz="800" dirty="0"/>
+                <a:t>SLIDER</a:t>
+              </a:r>
+            </a:p>
+            <a:p>
+              <a:r>
+                <a:rPr lang="en-US" sz="800" dirty="0"/>
+                <a:t>INFRA_SOLR_CLIENT</a:t>
+              </a:r>
+            </a:p>
+            <a:p>
+              <a:r>
+                <a:rPr lang="en-US" sz="800" dirty="0"/>
+                <a:t>LOGSEARCH_LOGFEEDER</a:t>
+              </a:r>
+            </a:p>
+            <a:p>
+              <a:endParaRPr lang="en-US" sz="800" i="1" dirty="0" smtClean="0"/>
+            </a:p>
+            <a:p>
               <a:endParaRPr lang="en-US" sz="800" dirty="0" smtClean="0"/>
             </a:p>
           </p:txBody>
@@ -8472,7 +8718,7 @@
           </p:nvSpPr>
           <p:spPr>
             <a:xfrm>
-              <a:off x="7124235" y="1437222"/>
+              <a:off x="7095660" y="1475322"/>
               <a:ext cx="678391" cy="276999"/>
             </a:xfrm>
             <a:prstGeom prst="rect">
@@ -8511,7 +8757,7 @@
         </p:nvSpPr>
         <p:spPr>
           <a:xfrm>
-            <a:off x="8586614" y="746015"/>
+            <a:off x="8576397" y="329273"/>
             <a:ext cx="728213" cy="276999"/>
           </a:xfrm>
           <a:prstGeom prst="rect">
@@ -8549,8 +8795,8 @@
         </p:nvSpPr>
         <p:spPr>
           <a:xfrm>
-            <a:off x="2957607" y="658980"/>
-            <a:ext cx="1335203" cy="2637692"/>
+            <a:off x="2957027" y="246322"/>
+            <a:ext cx="1335203" cy="3017691"/>
           </a:xfrm>
           <a:prstGeom prst="flowChartProcess">
             <a:avLst/>
@@ -8706,8 +8952,29 @@
           <a:p>
             <a:r>
               <a:rPr lang="en-US" sz="800" i="1" dirty="0" smtClean="0"/>
-              <a:t>METRICS_MONITOR</a:t>
-            </a:r>
+              <a:t>METRICS_MONITOR </a:t>
+            </a:r>
+            <a:r>
+              <a:rPr lang="en-US" sz="800" dirty="0"/>
+              <a:t>SLIDER</a:t>
+            </a:r>
+          </a:p>
+          <a:p>
+            <a:r>
+              <a:rPr lang="en-US" sz="800" dirty="0"/>
+              <a:t>INFRA_SOLR_CLIENT</a:t>
+            </a:r>
+          </a:p>
+          <a:p>
+            <a:r>
+              <a:rPr lang="en-US" sz="800" dirty="0"/>
+              <a:t>LOGSEARCH_LOGFEEDER</a:t>
+            </a:r>
+          </a:p>
+          <a:p>
+            <a:endParaRPr lang="en-US" sz="800" i="1" dirty="0" smtClean="0"/>
+          </a:p>
+          <a:p>
             <a:endParaRPr lang="en-US" sz="1050" dirty="0"/>
           </a:p>
         </p:txBody>
@@ -8720,8 +8987,8 @@
         </p:nvSpPr>
         <p:spPr>
           <a:xfrm>
-            <a:off x="2946264" y="3460195"/>
-            <a:ext cx="1335203" cy="3120714"/>
+            <a:off x="2946264" y="3326845"/>
+            <a:ext cx="1335203" cy="3455960"/>
           </a:xfrm>
           <a:prstGeom prst="flowChartProcess">
             <a:avLst/>
@@ -8902,6 +9169,27 @@
               <a:rPr lang="en-US" sz="800" i="1" dirty="0" smtClean="0"/>
               <a:t>METRICS_MONITOR</a:t>
             </a:r>
+          </a:p>
+          <a:p>
+            <a:r>
+              <a:rPr lang="en-US" sz="800" dirty="0"/>
+              <a:t>SLIDER</a:t>
+            </a:r>
+          </a:p>
+          <a:p>
+            <a:r>
+              <a:rPr lang="en-US" sz="800" dirty="0"/>
+              <a:t>INFRA_SOLR_CLIENT</a:t>
+            </a:r>
+          </a:p>
+          <a:p>
+            <a:r>
+              <a:rPr lang="en-US" sz="800" dirty="0"/>
+              <a:t>LOGSEARCH_LOGFEEDER</a:t>
+            </a:r>
+            <a:endParaRPr lang="en-US" sz="800" i="1" dirty="0"/>
+          </a:p>
+          <a:p>
             <a:endParaRPr lang="en-US" sz="800" i="1" dirty="0"/>
           </a:p>
         </p:txBody>
@@ -8914,7 +9202,7 @@
         </p:nvSpPr>
         <p:spPr>
           <a:xfrm>
-            <a:off x="5420554" y="7102432"/>
+            <a:off x="5428166" y="7203337"/>
             <a:ext cx="1023550" cy="461665"/>
           </a:xfrm>
           <a:prstGeom prst="rect">
@@ -8949,7 +9237,7 @@
         </p:nvSpPr>
         <p:spPr>
           <a:xfrm>
-            <a:off x="6333057" y="4694631"/>
+            <a:off x="6228282" y="4885131"/>
             <a:ext cx="1335203" cy="1171074"/>
           </a:xfrm>
           <a:prstGeom prst="flowChartProcess">
@@ -9029,9 +9317,9 @@
           <p:nvPr/>
         </p:nvCxnSpPr>
         <p:spPr>
-          <a:xfrm flipH="1">
-            <a:off x="5916904" y="5280168"/>
-            <a:ext cx="416153" cy="1000605"/>
+          <a:xfrm flipH="1" flipV="1">
+            <a:off x="5852617" y="5283112"/>
+            <a:ext cx="375665" cy="187556"/>
           </a:xfrm>
           <a:prstGeom prst="straightConnector1">
             <a:avLst/>
@@ -9130,8 +9418,8 @@
         </p:nvCxnSpPr>
         <p:spPr>
           <a:xfrm>
-            <a:off x="6809282" y="3980501"/>
-            <a:ext cx="191377" cy="714130"/>
+            <a:off x="6803338" y="4154875"/>
+            <a:ext cx="92546" cy="730256"/>
           </a:xfrm>
           <a:prstGeom prst="straightConnector1">
             <a:avLst/>
@@ -9166,8 +9454,8 @@
         </p:nvCxnSpPr>
         <p:spPr>
           <a:xfrm flipH="1">
-            <a:off x="7624900" y="4134863"/>
-            <a:ext cx="225899" cy="614515"/>
+            <a:off x="7545109" y="3684508"/>
+            <a:ext cx="245468" cy="1200623"/>
           </a:xfrm>
           <a:prstGeom prst="straightConnector1">
             <a:avLst/>
@@ -9202,7 +9490,7 @@
         </p:nvSpPr>
         <p:spPr>
           <a:xfrm>
-            <a:off x="7984945" y="4321902"/>
+            <a:off x="7804772" y="3854891"/>
             <a:ext cx="1335203" cy="1523757"/>
           </a:xfrm>
           <a:prstGeom prst="flowChartProcess">
@@ -9312,7 +9600,7 @@
         </p:nvSpPr>
         <p:spPr>
           <a:xfrm>
-            <a:off x="7979624" y="5951042"/>
+            <a:off x="7808797" y="5495643"/>
             <a:ext cx="1335203" cy="1093993"/>
           </a:xfrm>
           <a:prstGeom prst="flowChartProcess">
@@ -9448,6 +9736,13 @@
   <p:clrMapOvr>
     <a:masterClrMapping/>
   </p:clrMapOvr>
+  <p:timing>
+    <p:tnLst>
+      <p:par>
+        <p:cTn id="1" dur="indefinite" restart="never" nodeType="tmRoot"/>
+      </p:par>
+    </p:tnLst>
+  </p:timing>
 </p:sld>
 </file>
 

</xml_diff>